<commit_message>
v 1.28, static build NOT dll
</commit_message>
<xml_diff>
--- a/Docs/Slides/Meeting 24-09-24.pptx
+++ b/Docs/Slides/Meeting 24-09-24.pptx
@@ -5,19 +5,10 @@
     <p:sldMasterId id="2147483648" r:id="rId1"/>
   </p:sldMasterIdLst>
   <p:sldIdLst>
-    <p:sldId id="305" r:id="rId2"/>
-    <p:sldId id="317" r:id="rId3"/>
-    <p:sldId id="320" r:id="rId4"/>
-    <p:sldId id="318" r:id="rId5"/>
-    <p:sldId id="319" r:id="rId6"/>
-    <p:sldId id="321" r:id="rId7"/>
-    <p:sldId id="310" r:id="rId8"/>
-    <p:sldId id="311" r:id="rId9"/>
-    <p:sldId id="312" r:id="rId10"/>
-    <p:sldId id="313" r:id="rId11"/>
-    <p:sldId id="314" r:id="rId12"/>
-    <p:sldId id="315" r:id="rId13"/>
-    <p:sldId id="316" r:id="rId14"/>
+    <p:sldId id="322" r:id="rId2"/>
+    <p:sldId id="324" r:id="rId3"/>
+    <p:sldId id="323" r:id="rId4"/>
+    <p:sldId id="317" r:id="rId5"/>
   </p:sldIdLst>
   <p:sldSz cx="12192000" cy="6858000"/>
   <p:notesSz cx="6858000" cy="9144000"/>
@@ -3373,710 +3364,142 @@
       </p:grpSpPr>
       <p:sp>
         <p:nvSpPr>
-          <p:cNvPr id="6" name="Title 5">
-            <a:extLst>
-              <a:ext uri="{FF2B5EF4-FFF2-40B4-BE49-F238E27FC236}">
-                <a16:creationId xmlns:a16="http://schemas.microsoft.com/office/drawing/2014/main" id="{1F6A9C80-92BE-94DF-D7F9-7B11618B934E}"/>
-              </a:ext>
-            </a:extLst>
-          </p:cNvPr>
-          <p:cNvSpPr>
-            <a:spLocks noGrp="1"/>
-          </p:cNvSpPr>
-          <p:nvPr>
-            <p:ph type="title"/>
+          <p:cNvPr id="3" name="Content Placeholder 2">
+            <a:extLst>
+              <a:ext uri="{FF2B5EF4-FFF2-40B4-BE49-F238E27FC236}">
+                <a16:creationId xmlns:a16="http://schemas.microsoft.com/office/drawing/2014/main" id="{80D5D497-50BE-4DAA-9F47-78F040A65205}"/>
+              </a:ext>
+            </a:extLst>
+          </p:cNvPr>
+          <p:cNvSpPr>
+            <a:spLocks noGrp="1"/>
+          </p:cNvSpPr>
+          <p:nvPr>
+            <p:ph idx="1"/>
           </p:nvPr>
         </p:nvSpPr>
         <p:spPr>
           <a:xfrm>
-            <a:off x="838200" y="365126"/>
-            <a:ext cx="10515600" cy="1006474"/>
+            <a:off x="838200" y="1312745"/>
+            <a:ext cx="10515599" cy="4351338"/>
           </a:xfrm>
         </p:spPr>
         <p:txBody>
           <a:bodyPr>
-            <a:normAutofit fontScale="90000"/>
+            <a:normAutofit/>
           </a:bodyPr>
           <a:lstStyle/>
           <a:p>
             <a:r>
               <a:rPr lang="en-CA"/>
-              <a:t>Meeting August 13, 2024</a:t>
-            </a:r>
-            <a:br>
+              <a:t>Both MUT_Source and MUT_examples repositories have been updated</a:t>
+            </a:r>
+          </a:p>
+          <a:p>
+            <a:r>
               <a:rPr lang="en-CA"/>
-            </a:br>
+              <a:t>Examples have been run and there are some issues with a couple of them, described below.</a:t>
+            </a:r>
+          </a:p>
+          <a:p>
             <a:r>
               <a:rPr lang="en-CA"/>
-              <a:t>	</a:t>
-            </a:r>
-          </a:p>
-        </p:txBody>
-      </p:sp>
-      <p:sp>
-        <p:nvSpPr>
-          <p:cNvPr id="3" name="Content Placeholder 2">
-            <a:extLst>
-              <a:ext uri="{FF2B5EF4-FFF2-40B4-BE49-F238E27FC236}">
-                <a16:creationId xmlns:a16="http://schemas.microsoft.com/office/drawing/2014/main" id="{80D5D497-50BE-4DAA-9F47-78F040A65205}"/>
-              </a:ext>
-            </a:extLst>
-          </p:cNvPr>
-          <p:cNvSpPr>
-            <a:spLocks noGrp="1"/>
-          </p:cNvSpPr>
-          <p:nvPr>
-            <p:ph idx="1"/>
-          </p:nvPr>
+              <a:t>The manual is a work in progress.  It needs a few more days at least to fill in missing content. </a:t>
+            </a:r>
+          </a:p>
+          <a:p>
+            <a:r>
+              <a:rPr lang="en-CA"/>
+              <a:t>Software distribution methods need review    </a:t>
+            </a:r>
+          </a:p>
+          <a:p>
+            <a:r>
+              <a:rPr lang="en-CA"/>
+              <a:t>I’m currently running the Visual Studio 2022 community version and a very recent Intel Fortran version</a:t>
+            </a:r>
+          </a:p>
+        </p:txBody>
+      </p:sp>
+      <p:sp>
+        <p:nvSpPr>
+          <p:cNvPr id="2" name="Title 5">
+            <a:extLst>
+              <a:ext uri="{FF2B5EF4-FFF2-40B4-BE49-F238E27FC236}">
+                <a16:creationId xmlns:a16="http://schemas.microsoft.com/office/drawing/2014/main" id="{7C4B3B28-8962-8CCA-3C81-5E4A09697222}"/>
+              </a:ext>
+            </a:extLst>
+          </p:cNvPr>
+          <p:cNvSpPr txBox="1">
+            <a:spLocks/>
+          </p:cNvSpPr>
+          <p:nvPr/>
         </p:nvSpPr>
         <p:spPr>
           <a:xfrm>
-            <a:off x="838200" y="1371600"/>
-            <a:ext cx="10515600" cy="4351338"/>
-          </a:xfrm>
-        </p:spPr>
-        <p:txBody>
-          <a:bodyPr>
-            <a:normAutofit fontScale="92500" lnSpcReduction="10000"/>
-          </a:bodyPr>
-          <a:lstStyle/>
-          <a:p>
-            <a:r>
-              <a:rPr lang="en-CA"/>
-              <a:t>The problem with the Abdul surface water depths being too small has been fixed</a:t>
-            </a:r>
-          </a:p>
-          <a:p>
-            <a:r>
-              <a:rPr lang="en-CA"/>
-              <a:t>The repositories for MUT_Source and MUT_Examples have been updated </a:t>
-            </a:r>
-          </a:p>
-          <a:p>
-            <a:r>
-              <a:rPr lang="en-CA"/>
-              <a:t>Stress Period time stepping inputs can now be defined.  MUT was previously using fixed default values</a:t>
-            </a:r>
-          </a:p>
-          <a:p>
-            <a:r>
-              <a:rPr lang="en-CA"/>
-              <a:t>A combo box is now used to choose unsaturated function type in GWF materials database </a:t>
-            </a:r>
-          </a:p>
-          <a:p>
-            <a:r>
-              <a:rPr lang="en-CA"/>
-              <a:t>Materials database values are now shown in the MUT echo (.eco) file. </a:t>
-            </a:r>
-          </a:p>
-          <a:p>
-            <a:r>
-              <a:rPr lang="en-CA"/>
-              <a:t>Currently, the MUT build assumes time units of seconds and length units of metres for all inputs.    </a:t>
-            </a:r>
-          </a:p>
-          <a:p>
-            <a:r>
-              <a:rPr lang="en-CA"/>
-              <a:t>Some results for the example problems are presented below</a:t>
-            </a:r>
-          </a:p>
-        </p:txBody>
-      </p:sp>
-    </p:spTree>
-    <p:extLst>
-      <p:ext uri="{BB962C8B-B14F-4D97-AF65-F5344CB8AC3E}">
-        <p14:creationId xmlns:p14="http://schemas.microsoft.com/office/powerpoint/2010/main" val="2703993742"/>
-      </p:ext>
-    </p:extLst>
-  </p:cSld>
-  <p:clrMapOvr>
-    <a:masterClrMapping/>
-  </p:clrMapOvr>
-</p:sld>
-</file>
-
-<file path=ppt/slides/slide10.xml><?xml version="1.0" encoding="utf-8"?>
-<p:sld xmlns:a="http://schemas.openxmlformats.org/drawingml/2006/main" xmlns:r="http://schemas.openxmlformats.org/officeDocument/2006/relationships" xmlns:p="http://schemas.openxmlformats.org/presentationml/2006/main">
-  <p:cSld>
-    <p:spTree>
-      <p:nvGrpSpPr>
-        <p:cNvPr id="1" name=""/>
-        <p:cNvGrpSpPr/>
-        <p:nvPr/>
-      </p:nvGrpSpPr>
-      <p:grpSpPr>
-        <a:xfrm>
-          <a:off x="0" y="0"/>
-          <a:ext cx="0" cy="0"/>
-          <a:chOff x="0" y="0"/>
-          <a:chExt cx="0" cy="0"/>
-        </a:xfrm>
-      </p:grpSpPr>
-      <p:pic>
-        <p:nvPicPr>
-          <p:cNvPr id="6" name="Picture 5">
-            <a:extLst>
-              <a:ext uri="{FF2B5EF4-FFF2-40B4-BE49-F238E27FC236}">
-                <a16:creationId xmlns:a16="http://schemas.microsoft.com/office/drawing/2014/main" id="{17234309-D2A4-234D-82DD-FFC38FD1C2EC}"/>
-              </a:ext>
-            </a:extLst>
-          </p:cNvPr>
-          <p:cNvPicPr>
-            <a:picLocks noChangeAspect="1"/>
-          </p:cNvPicPr>
-          <p:nvPr/>
-        </p:nvPicPr>
-        <p:blipFill>
-          <a:blip r:embed="rId2">
-            <a:extLst>
-              <a:ext uri="{28A0092B-C50C-407E-A947-70E740481C1C}">
-                <a14:useLocalDpi xmlns:a14="http://schemas.microsoft.com/office/drawing/2010/main" val="0"/>
-              </a:ext>
-            </a:extLst>
-          </a:blip>
-          <a:stretch>
-            <a:fillRect/>
-          </a:stretch>
-        </p:blipFill>
-        <p:spPr>
-          <a:xfrm>
-            <a:off x="229305" y="0"/>
-            <a:ext cx="11733389" cy="6858000"/>
+            <a:off x="838200" y="306271"/>
+            <a:ext cx="10515600" cy="1006474"/>
           </a:xfrm>
           <a:prstGeom prst="rect">
             <a:avLst/>
           </a:prstGeom>
         </p:spPr>
-      </p:pic>
-      <p:sp>
-        <p:nvSpPr>
-          <p:cNvPr id="4" name="TextBox 3">
-            <a:extLst>
-              <a:ext uri="{FF2B5EF4-FFF2-40B4-BE49-F238E27FC236}">
-                <a16:creationId xmlns:a16="http://schemas.microsoft.com/office/drawing/2014/main" id="{5644235C-4D64-AAF5-663A-8AE98D301E27}"/>
-              </a:ext>
-            </a:extLst>
-          </p:cNvPr>
-          <p:cNvSpPr txBox="1"/>
+        <p:txBody>
+          <a:bodyPr vert="horz" lIns="91440" tIns="45720" rIns="91440" bIns="45720" rtlCol="0" anchor="ctr">
+            <a:normAutofit fontScale="90000" lnSpcReduction="20000"/>
+          </a:bodyPr>
+          <a:lstStyle>
+            <a:lvl1pPr algn="l" defTabSz="914400" rtl="0" eaLnBrk="1" latinLnBrk="0" hangingPunct="1">
+              <a:lnSpc>
+                <a:spcPct val="90000"/>
+              </a:lnSpc>
+              <a:spcBef>
+                <a:spcPct val="0"/>
+              </a:spcBef>
+              <a:buNone/>
+              <a:defRPr sz="4400" kern="1200">
+                <a:solidFill>
+                  <a:schemeClr val="tx1"/>
+                </a:solidFill>
+                <a:latin typeface="+mj-lt"/>
+                <a:ea typeface="+mj-ea"/>
+                <a:cs typeface="+mj-cs"/>
+              </a:defRPr>
+            </a:lvl1pPr>
+          </a:lstStyle>
+          <a:p>
+            <a:r>
+              <a:rPr lang="en-CA"/>
+              <a:t>Meeting September 24, 2024</a:t>
+            </a:r>
+            <a:br>
+              <a:rPr lang="en-CA"/>
+            </a:br>
+            <a:r>
+              <a:rPr lang="en-CA"/>
+              <a:t>	</a:t>
+            </a:r>
+          </a:p>
+        </p:txBody>
+      </p:sp>
+      <p:sp>
+        <p:nvSpPr>
+          <p:cNvPr id="5" name="Content Placeholder 2">
+            <a:extLst>
+              <a:ext uri="{FF2B5EF4-FFF2-40B4-BE49-F238E27FC236}">
+                <a16:creationId xmlns:a16="http://schemas.microsoft.com/office/drawing/2014/main" id="{77E8E7ED-72A8-4254-BCF2-EB48EB64D02C}"/>
+              </a:ext>
+            </a:extLst>
+          </p:cNvPr>
+          <p:cNvSpPr txBox="1">
+            <a:spLocks/>
+          </p:cNvSpPr>
           <p:nvPr/>
         </p:nvSpPr>
         <p:spPr>
           <a:xfrm>
-            <a:off x="413656" y="674914"/>
-            <a:ext cx="9278984" cy="646331"/>
-          </a:xfrm>
-          <a:prstGeom prst="rect">
-            <a:avLst/>
-          </a:prstGeom>
-          <a:solidFill>
-            <a:srgbClr val="FFFF00"/>
-          </a:solidFill>
-        </p:spPr>
-        <p:txBody>
-          <a:bodyPr wrap="square" rtlCol="0">
-            <a:spAutoFit/>
-          </a:bodyPr>
-          <a:lstStyle/>
-          <a:p>
-            <a:r>
-              <a:rPr lang="en-CA"/>
-              <a:t>This is the case with a SWF domain and a critical depth boundary at the left end.  The water table is extended to show the level in the SFW domain. </a:t>
-            </a:r>
-          </a:p>
-        </p:txBody>
-      </p:sp>
-    </p:spTree>
-    <p:extLst>
-      <p:ext uri="{BB962C8B-B14F-4D97-AF65-F5344CB8AC3E}">
-        <p14:creationId xmlns:p14="http://schemas.microsoft.com/office/powerpoint/2010/main" val="3183240301"/>
-      </p:ext>
-    </p:extLst>
-  </p:cSld>
-  <p:clrMapOvr>
-    <a:masterClrMapping/>
-  </p:clrMapOvr>
-</p:sld>
-</file>
-
-<file path=ppt/slides/slide11.xml><?xml version="1.0" encoding="utf-8"?>
-<p:sld xmlns:a="http://schemas.openxmlformats.org/drawingml/2006/main" xmlns:r="http://schemas.openxmlformats.org/officeDocument/2006/relationships" xmlns:p="http://schemas.openxmlformats.org/presentationml/2006/main">
-  <p:cSld>
-    <p:spTree>
-      <p:nvGrpSpPr>
-        <p:cNvPr id="1" name=""/>
-        <p:cNvGrpSpPr/>
-        <p:nvPr/>
-      </p:nvGrpSpPr>
-      <p:grpSpPr>
-        <a:xfrm>
-          <a:off x="0" y="0"/>
-          <a:ext cx="0" cy="0"/>
-          <a:chOff x="0" y="0"/>
-          <a:chExt cx="0" cy="0"/>
-        </a:xfrm>
-      </p:grpSpPr>
-      <p:pic>
-        <p:nvPicPr>
-          <p:cNvPr id="3" name="Picture 2">
-            <a:extLst>
-              <a:ext uri="{FF2B5EF4-FFF2-40B4-BE49-F238E27FC236}">
-                <a16:creationId xmlns:a16="http://schemas.microsoft.com/office/drawing/2014/main" id="{7E724B94-A767-6936-5706-F9F6447CB644}"/>
-              </a:ext>
-            </a:extLst>
-          </p:cNvPr>
-          <p:cNvPicPr>
-            <a:picLocks noChangeAspect="1"/>
-          </p:cNvPicPr>
-          <p:nvPr/>
-        </p:nvPicPr>
-        <p:blipFill>
-          <a:blip r:embed="rId2">
-            <a:extLst>
-              <a:ext uri="{28A0092B-C50C-407E-A947-70E740481C1C}">
-                <a14:useLocalDpi xmlns:a14="http://schemas.microsoft.com/office/drawing/2010/main" val="0"/>
-              </a:ext>
-            </a:extLst>
-          </a:blip>
-          <a:stretch>
-            <a:fillRect/>
-          </a:stretch>
-        </p:blipFill>
-        <p:spPr>
-          <a:xfrm>
-            <a:off x="220744" y="0"/>
-            <a:ext cx="11750511" cy="6858000"/>
-          </a:xfrm>
-          <a:prstGeom prst="rect">
-            <a:avLst/>
-          </a:prstGeom>
-        </p:spPr>
-      </p:pic>
-      <p:sp>
-        <p:nvSpPr>
-          <p:cNvPr id="4" name="TextBox 3">
-            <a:extLst>
-              <a:ext uri="{FF2B5EF4-FFF2-40B4-BE49-F238E27FC236}">
-                <a16:creationId xmlns:a16="http://schemas.microsoft.com/office/drawing/2014/main" id="{27BF4B51-E30C-F7E8-C694-BF4EFB1D1E34}"/>
-              </a:ext>
-            </a:extLst>
-          </p:cNvPr>
-          <p:cNvSpPr txBox="1"/>
-          <p:nvPr/>
-        </p:nvSpPr>
-        <p:spPr>
-          <a:xfrm>
-            <a:off x="8225244" y="4367348"/>
-            <a:ext cx="2956561" cy="923330"/>
-          </a:xfrm>
-          <a:prstGeom prst="rect">
-            <a:avLst/>
-          </a:prstGeom>
-          <a:solidFill>
-            <a:srgbClr val="FFFF00"/>
-          </a:solidFill>
-        </p:spPr>
-        <p:txBody>
-          <a:bodyPr wrap="square" rtlCol="0">
-            <a:spAutoFit/>
-          </a:bodyPr>
-          <a:lstStyle/>
-          <a:p>
-            <a:r>
-              <a:rPr lang="en-CA"/>
-              <a:t>SWF depths are now restored to the results we had before last April.</a:t>
-            </a:r>
-          </a:p>
-        </p:txBody>
-      </p:sp>
-    </p:spTree>
-    <p:extLst>
-      <p:ext uri="{BB962C8B-B14F-4D97-AF65-F5344CB8AC3E}">
-        <p14:creationId xmlns:p14="http://schemas.microsoft.com/office/powerpoint/2010/main" val="555991481"/>
-      </p:ext>
-    </p:extLst>
-  </p:cSld>
-  <p:clrMapOvr>
-    <a:masterClrMapping/>
-  </p:clrMapOvr>
-</p:sld>
-</file>
-
-<file path=ppt/slides/slide12.xml><?xml version="1.0" encoding="utf-8"?>
-<p:sld xmlns:a="http://schemas.openxmlformats.org/drawingml/2006/main" xmlns:r="http://schemas.openxmlformats.org/officeDocument/2006/relationships" xmlns:p="http://schemas.openxmlformats.org/presentationml/2006/main">
-  <p:cSld>
-    <p:spTree>
-      <p:nvGrpSpPr>
-        <p:cNvPr id="1" name=""/>
-        <p:cNvGrpSpPr/>
-        <p:nvPr/>
-      </p:nvGrpSpPr>
-      <p:grpSpPr>
-        <a:xfrm>
-          <a:off x="0" y="0"/>
-          <a:ext cx="0" cy="0"/>
-          <a:chOff x="0" y="0"/>
-          <a:chExt cx="0" cy="0"/>
-        </a:xfrm>
-      </p:grpSpPr>
-      <p:pic>
-        <p:nvPicPr>
-          <p:cNvPr id="3" name="Picture 2">
-            <a:extLst>
-              <a:ext uri="{FF2B5EF4-FFF2-40B4-BE49-F238E27FC236}">
-                <a16:creationId xmlns:a16="http://schemas.microsoft.com/office/drawing/2014/main" id="{55E2D006-FA65-2743-5C8F-61E39F7BCB5E}"/>
-              </a:ext>
-            </a:extLst>
-          </p:cNvPr>
-          <p:cNvPicPr>
-            <a:picLocks noChangeAspect="1"/>
-          </p:cNvPicPr>
-          <p:nvPr/>
-        </p:nvPicPr>
-        <p:blipFill>
-          <a:blip r:embed="rId2">
-            <a:extLst>
-              <a:ext uri="{28A0092B-C50C-407E-A947-70E740481C1C}">
-                <a14:useLocalDpi xmlns:a14="http://schemas.microsoft.com/office/drawing/2010/main" val="0"/>
-              </a:ext>
-            </a:extLst>
-          </a:blip>
-          <a:stretch>
-            <a:fillRect/>
-          </a:stretch>
-        </p:blipFill>
-        <p:spPr>
-          <a:xfrm>
-            <a:off x="220744" y="0"/>
-            <a:ext cx="11750511" cy="6858000"/>
-          </a:xfrm>
-          <a:prstGeom prst="rect">
-            <a:avLst/>
-          </a:prstGeom>
-        </p:spPr>
-      </p:pic>
-    </p:spTree>
-    <p:extLst>
-      <p:ext uri="{BB962C8B-B14F-4D97-AF65-F5344CB8AC3E}">
-        <p14:creationId xmlns:p14="http://schemas.microsoft.com/office/powerpoint/2010/main" val="3663569478"/>
-      </p:ext>
-    </p:extLst>
-  </p:cSld>
-  <p:clrMapOvr>
-    <a:masterClrMapping/>
-  </p:clrMapOvr>
-</p:sld>
-</file>
-
-<file path=ppt/slides/slide13.xml><?xml version="1.0" encoding="utf-8"?>
-<p:sld xmlns:a="http://schemas.openxmlformats.org/drawingml/2006/main" xmlns:r="http://schemas.openxmlformats.org/officeDocument/2006/relationships" xmlns:p="http://schemas.openxmlformats.org/presentationml/2006/main">
-  <p:cSld>
-    <p:spTree>
-      <p:nvGrpSpPr>
-        <p:cNvPr id="1" name=""/>
-        <p:cNvGrpSpPr/>
-        <p:nvPr/>
-      </p:nvGrpSpPr>
-      <p:grpSpPr>
-        <a:xfrm>
-          <a:off x="0" y="0"/>
-          <a:ext cx="0" cy="0"/>
-          <a:chOff x="0" y="0"/>
-          <a:chExt cx="0" cy="0"/>
-        </a:xfrm>
-      </p:grpSpPr>
-      <p:pic>
-        <p:nvPicPr>
-          <p:cNvPr id="3" name="Picture 2">
-            <a:extLst>
-              <a:ext uri="{FF2B5EF4-FFF2-40B4-BE49-F238E27FC236}">
-                <a16:creationId xmlns:a16="http://schemas.microsoft.com/office/drawing/2014/main" id="{9D98FA02-3AAD-2D34-6BDA-30BBD8DDDC38}"/>
-              </a:ext>
-            </a:extLst>
-          </p:cNvPr>
-          <p:cNvPicPr>
-            <a:picLocks noChangeAspect="1"/>
-          </p:cNvPicPr>
-          <p:nvPr/>
-        </p:nvPicPr>
-        <p:blipFill>
-          <a:blip r:embed="rId2">
-            <a:extLst>
-              <a:ext uri="{28A0092B-C50C-407E-A947-70E740481C1C}">
-                <a14:useLocalDpi xmlns:a14="http://schemas.microsoft.com/office/drawing/2010/main" val="0"/>
-              </a:ext>
-            </a:extLst>
-          </a:blip>
-          <a:stretch>
-            <a:fillRect/>
-          </a:stretch>
-        </p:blipFill>
-        <p:spPr>
-          <a:xfrm>
-            <a:off x="390397" y="0"/>
-            <a:ext cx="11411205" cy="6858000"/>
-          </a:xfrm>
-          <a:prstGeom prst="rect">
-            <a:avLst/>
-          </a:prstGeom>
-        </p:spPr>
-      </p:pic>
-      <p:sp>
-        <p:nvSpPr>
-          <p:cNvPr id="4" name="TextBox 3">
-            <a:extLst>
-              <a:ext uri="{FF2B5EF4-FFF2-40B4-BE49-F238E27FC236}">
-                <a16:creationId xmlns:a16="http://schemas.microsoft.com/office/drawing/2014/main" id="{6CB0A197-68A9-7B56-2DA8-4984C5AE5167}"/>
-              </a:ext>
-            </a:extLst>
-          </p:cNvPr>
-          <p:cNvSpPr txBox="1"/>
-          <p:nvPr/>
-        </p:nvSpPr>
-        <p:spPr>
-          <a:xfrm>
-            <a:off x="7545975" y="2582091"/>
-            <a:ext cx="2956561" cy="1200329"/>
-          </a:xfrm>
-          <a:prstGeom prst="rect">
-            <a:avLst/>
-          </a:prstGeom>
-          <a:solidFill>
-            <a:srgbClr val="FFFF00"/>
-          </a:solidFill>
-        </p:spPr>
-        <p:txBody>
-          <a:bodyPr wrap="square" rtlCol="0">
-            <a:spAutoFit/>
-          </a:bodyPr>
-          <a:lstStyle/>
-          <a:p>
-            <a:r>
-              <a:rPr lang="en-CA"/>
-              <a:t>We need to show the results that were calibrated to match HGS and include the HGS results</a:t>
-            </a:r>
-          </a:p>
-        </p:txBody>
-      </p:sp>
-    </p:spTree>
-    <p:extLst>
-      <p:ext uri="{BB962C8B-B14F-4D97-AF65-F5344CB8AC3E}">
-        <p14:creationId xmlns:p14="http://schemas.microsoft.com/office/powerpoint/2010/main" val="177566882"/>
-      </p:ext>
-    </p:extLst>
-  </p:cSld>
-  <p:clrMapOvr>
-    <a:masterClrMapping/>
-  </p:clrMapOvr>
-</p:sld>
-</file>
-
-<file path=ppt/slides/slide2.xml><?xml version="1.0" encoding="utf-8"?>
-<p:sld xmlns:a="http://schemas.openxmlformats.org/drawingml/2006/main" xmlns:r="http://schemas.openxmlformats.org/officeDocument/2006/relationships" xmlns:p="http://schemas.openxmlformats.org/presentationml/2006/main">
-  <p:cSld>
-    <p:spTree>
-      <p:nvGrpSpPr>
-        <p:cNvPr id="1" name=""/>
-        <p:cNvGrpSpPr/>
-        <p:nvPr/>
-      </p:nvGrpSpPr>
-      <p:grpSpPr>
-        <a:xfrm>
-          <a:off x="0" y="0"/>
-          <a:ext cx="0" cy="0"/>
-          <a:chOff x="0" y="0"/>
-          <a:chExt cx="0" cy="0"/>
-        </a:xfrm>
-      </p:grpSpPr>
-      <p:sp>
-        <p:nvSpPr>
-          <p:cNvPr id="2" name="Title 1">
-            <a:extLst>
-              <a:ext uri="{FF2B5EF4-FFF2-40B4-BE49-F238E27FC236}">
-                <a16:creationId xmlns:a16="http://schemas.microsoft.com/office/drawing/2014/main" id="{A24F867E-596F-0DE3-5A65-E9776ECDB27C}"/>
-              </a:ext>
-            </a:extLst>
-          </p:cNvPr>
-          <p:cNvSpPr>
-            <a:spLocks noGrp="1"/>
-          </p:cNvSpPr>
-          <p:nvPr>
-            <p:ph type="title"/>
-          </p:nvPr>
-        </p:nvSpPr>
-        <p:spPr>
-          <a:xfrm>
-            <a:off x="838200" y="138702"/>
-            <a:ext cx="10515600" cy="671195"/>
-          </a:xfrm>
-        </p:spPr>
-        <p:txBody>
-          <a:bodyPr>
-            <a:normAutofit fontScale="90000"/>
-          </a:bodyPr>
-          <a:lstStyle/>
-          <a:p>
-            <a:r>
-              <a:rPr lang="en-CA"/>
-              <a:t>Stress Period time stepping inputs</a:t>
-            </a:r>
-          </a:p>
-        </p:txBody>
-      </p:sp>
-      <p:sp>
-        <p:nvSpPr>
-          <p:cNvPr id="3" name="Content Placeholder 2">
-            <a:extLst>
-              <a:ext uri="{FF2B5EF4-FFF2-40B4-BE49-F238E27FC236}">
-                <a16:creationId xmlns:a16="http://schemas.microsoft.com/office/drawing/2014/main" id="{07D9778E-4374-8A29-D999-DB990900AE2B}"/>
-              </a:ext>
-            </a:extLst>
-          </p:cNvPr>
-          <p:cNvSpPr>
-            <a:spLocks noGrp="1"/>
-          </p:cNvSpPr>
-          <p:nvPr>
-            <p:ph idx="1"/>
-          </p:nvPr>
-        </p:nvSpPr>
-        <p:spPr>
-          <a:xfrm>
-            <a:off x="838200" y="809897"/>
-            <a:ext cx="3371850" cy="5367066"/>
-          </a:xfrm>
-        </p:spPr>
-        <p:txBody>
-          <a:bodyPr/>
-          <a:lstStyle/>
-          <a:p>
-            <a:pPr marL="0" indent="0">
-              <a:buNone/>
-            </a:pPr>
-            <a:r>
-              <a:rPr lang="en-CA" sz="1800">
-                <a:solidFill>
-                  <a:srgbClr val="000000"/>
-                </a:solidFill>
-              </a:rPr>
-              <a:t>Default values:</a:t>
-            </a:r>
-          </a:p>
-          <a:p>
-            <a:r>
-              <a:rPr lang="en-CA" sz="1800">
-                <a:solidFill>
-                  <a:srgbClr val="000000"/>
-                </a:solidFill>
-              </a:rPr>
-              <a:t>Deltat=1.000000e-03</a:t>
-            </a:r>
-          </a:p>
-          <a:p>
-            <a:r>
-              <a:rPr lang="en-CA" sz="1800">
-                <a:solidFill>
-                  <a:srgbClr val="000000"/>
-                </a:solidFill>
-              </a:rPr>
-              <a:t>Tminat=1.000000e-05</a:t>
-            </a:r>
-          </a:p>
-          <a:p>
-            <a:r>
-              <a:rPr lang="en-CA" sz="1800">
-                <a:solidFill>
-                  <a:srgbClr val="000000"/>
-                </a:solidFill>
-              </a:rPr>
-              <a:t>Tmaxat=60.0d0</a:t>
-            </a:r>
-          </a:p>
-          <a:p>
-            <a:r>
-              <a:rPr lang="en-CA" sz="1800">
-                <a:solidFill>
-                  <a:srgbClr val="000000"/>
-                </a:solidFill>
-              </a:rPr>
-              <a:t>Tadjat=1.100000e+00</a:t>
-            </a:r>
-          </a:p>
-          <a:p>
-            <a:r>
-              <a:rPr lang="en-CA" sz="1800">
-                <a:solidFill>
-                  <a:srgbClr val="000000"/>
-                </a:solidFill>
-              </a:rPr>
-              <a:t>Tcutat=2.000000e+00</a:t>
-            </a:r>
-          </a:p>
-          <a:p>
-            <a:pPr marL="0" indent="0">
-              <a:buNone/>
-            </a:pPr>
-            <a:endParaRPr lang="en-CA" sz="1800">
-              <a:solidFill>
-                <a:srgbClr val="000000"/>
-              </a:solidFill>
-            </a:endParaRPr>
-          </a:p>
-        </p:txBody>
-      </p:sp>
-      <p:pic>
-        <p:nvPicPr>
-          <p:cNvPr id="5" name="Picture 4">
-            <a:extLst>
-              <a:ext uri="{FF2B5EF4-FFF2-40B4-BE49-F238E27FC236}">
-                <a16:creationId xmlns:a16="http://schemas.microsoft.com/office/drawing/2014/main" id="{1D69575C-412F-DC94-7A2E-D841924ED6E2}"/>
-              </a:ext>
-            </a:extLst>
-          </p:cNvPr>
-          <p:cNvPicPr>
-            <a:picLocks noChangeAspect="1"/>
-          </p:cNvPicPr>
-          <p:nvPr/>
-        </p:nvPicPr>
-        <p:blipFill>
-          <a:blip r:embed="rId2"/>
-          <a:stretch>
-            <a:fillRect/>
-          </a:stretch>
-        </p:blipFill>
-        <p:spPr>
-          <a:xfrm>
-            <a:off x="4446019" y="871450"/>
-            <a:ext cx="7487695" cy="2581635"/>
-          </a:xfrm>
-          <a:prstGeom prst="rect">
-            <a:avLst/>
-          </a:prstGeom>
-          <a:ln>
-            <a:solidFill>
-              <a:schemeClr val="accent1"/>
-            </a:solidFill>
-          </a:ln>
-        </p:spPr>
-      </p:pic>
-      <p:sp>
-        <p:nvSpPr>
-          <p:cNvPr id="6" name="Content Placeholder 2">
-            <a:extLst>
-              <a:ext uri="{FF2B5EF4-FFF2-40B4-BE49-F238E27FC236}">
-                <a16:creationId xmlns:a16="http://schemas.microsoft.com/office/drawing/2014/main" id="{197C7CF9-B3A6-2B28-00F8-65364FBEADB0}"/>
-              </a:ext>
-            </a:extLst>
-          </p:cNvPr>
-          <p:cNvSpPr txBox="1">
-            <a:spLocks/>
-          </p:cNvSpPr>
-          <p:nvPr/>
-        </p:nvSpPr>
-        <p:spPr>
-          <a:xfrm>
-            <a:off x="4446019" y="3493430"/>
-            <a:ext cx="7487695" cy="671195"/>
+            <a:off x="724989" y="893513"/>
+            <a:ext cx="6511834" cy="4351338"/>
           </a:xfrm>
           <a:prstGeom prst="rect">
             <a:avLst/>
@@ -4251,28 +3674,159 @@
             </a:lvl9pPr>
           </a:lstStyle>
           <a:p>
-            <a:pPr marL="0" indent="0">
-              <a:buFont typeface="Arial" panose="020B0604020202020204" pitchFamily="34" charset="0"/>
-              <a:buNone/>
-            </a:pPr>
-            <a:r>
-              <a:rPr lang="en-CA" sz="1800">
-                <a:solidFill>
-                  <a:srgbClr val="000000"/>
-                </a:solidFill>
-              </a:rPr>
-              <a:t>Default values can be changed inside the stress period definition in the MUT input .mut file as shown here for Tmaxat. </a:t>
-            </a:r>
-            <a:endParaRPr lang="en-CA"/>
+            <a:endParaRPr lang="en-CA"/>
+          </a:p>
+        </p:txBody>
+      </p:sp>
+    </p:spTree>
+    <p:extLst>
+      <p:ext uri="{BB962C8B-B14F-4D97-AF65-F5344CB8AC3E}">
+        <p14:creationId xmlns:p14="http://schemas.microsoft.com/office/powerpoint/2010/main" val="1728845485"/>
+      </p:ext>
+    </p:extLst>
+  </p:cSld>
+  <p:clrMapOvr>
+    <a:masterClrMapping/>
+  </p:clrMapOvr>
+</p:sld>
+</file>
+
+<file path=ppt/slides/slide2.xml><?xml version="1.0" encoding="utf-8"?>
+<p:sld xmlns:a="http://schemas.openxmlformats.org/drawingml/2006/main" xmlns:r="http://schemas.openxmlformats.org/officeDocument/2006/relationships" xmlns:p="http://schemas.openxmlformats.org/presentationml/2006/main">
+  <p:cSld>
+    <p:spTree>
+      <p:nvGrpSpPr>
+        <p:cNvPr id="1" name=""/>
+        <p:cNvGrpSpPr/>
+        <p:nvPr/>
+      </p:nvGrpSpPr>
+      <p:grpSpPr>
+        <a:xfrm>
+          <a:off x="0" y="0"/>
+          <a:ext cx="0" cy="0"/>
+          <a:chOff x="0" y="0"/>
+          <a:chExt cx="0" cy="0"/>
+        </a:xfrm>
+      </p:grpSpPr>
+      <p:sp>
+        <p:nvSpPr>
+          <p:cNvPr id="6" name="Title 5">
+            <a:extLst>
+              <a:ext uri="{FF2B5EF4-FFF2-40B4-BE49-F238E27FC236}">
+                <a16:creationId xmlns:a16="http://schemas.microsoft.com/office/drawing/2014/main" id="{1F6A9C80-92BE-94DF-D7F9-7B11618B934E}"/>
+              </a:ext>
+            </a:extLst>
+          </p:cNvPr>
+          <p:cNvSpPr>
+            <a:spLocks noGrp="1"/>
+          </p:cNvSpPr>
+          <p:nvPr>
+            <p:ph type="title"/>
+          </p:nvPr>
+        </p:nvSpPr>
+        <p:spPr>
+          <a:xfrm>
+            <a:off x="838200" y="2565945"/>
+            <a:ext cx="10515600" cy="1006474"/>
+          </a:xfrm>
+        </p:spPr>
+        <p:txBody>
+          <a:bodyPr>
+            <a:noAutofit/>
+          </a:bodyPr>
+          <a:lstStyle/>
+          <a:p>
+            <a:r>
+              <a:rPr lang="en-CA" sz="3600" b="1"/>
+              <a:t>Example 6_Abdul_MODHMS</a:t>
+            </a:r>
+            <a:br>
+              <a:rPr lang="en-CA" sz="3600" b="1"/>
+            </a:br>
+            <a:r>
+              <a:rPr lang="en-CA" sz="3600" b="1"/>
+              <a:t>	</a:t>
+            </a:r>
+          </a:p>
+        </p:txBody>
+      </p:sp>
+      <p:sp>
+        <p:nvSpPr>
+          <p:cNvPr id="3" name="Content Placeholder 2">
+            <a:extLst>
+              <a:ext uri="{FF2B5EF4-FFF2-40B4-BE49-F238E27FC236}">
+                <a16:creationId xmlns:a16="http://schemas.microsoft.com/office/drawing/2014/main" id="{80D5D497-50BE-4DAA-9F47-78F040A65205}"/>
+              </a:ext>
+            </a:extLst>
+          </p:cNvPr>
+          <p:cNvSpPr>
+            <a:spLocks noGrp="1"/>
+          </p:cNvSpPr>
+          <p:nvPr>
+            <p:ph idx="1"/>
+          </p:nvPr>
+        </p:nvSpPr>
+        <p:spPr>
+          <a:xfrm>
+            <a:off x="838200" y="3485333"/>
+            <a:ext cx="6511834" cy="4351338"/>
+          </a:xfrm>
+        </p:spPr>
+        <p:txBody>
+          <a:bodyPr>
+            <a:normAutofit/>
+          </a:bodyPr>
+          <a:lstStyle/>
+          <a:p>
+            <a:r>
+              <a:rPr lang="en-CA"/>
+              <a:t>The example is mirrored in Y relative to our Abdul model</a:t>
+            </a:r>
+          </a:p>
+          <a:p>
+            <a:r>
+              <a:rPr lang="en-CA"/>
+              <a:t>Is this from the original MODHMS data or is it an error in the elevation_MUT_001.dat file?</a:t>
+            </a:r>
           </a:p>
         </p:txBody>
       </p:sp>
       <p:pic>
         <p:nvPicPr>
-          <p:cNvPr id="8" name="Picture 7">
-            <a:extLst>
-              <a:ext uri="{FF2B5EF4-FFF2-40B4-BE49-F238E27FC236}">
-                <a16:creationId xmlns:a16="http://schemas.microsoft.com/office/drawing/2014/main" id="{A9269E88-85DE-6D94-2288-8E25B92D260B}"/>
+          <p:cNvPr id="4" name="Picture 3">
+            <a:extLst>
+              <a:ext uri="{FF2B5EF4-FFF2-40B4-BE49-F238E27FC236}">
+                <a16:creationId xmlns:a16="http://schemas.microsoft.com/office/drawing/2014/main" id="{0B5B41D0-827D-1175-3CFC-A61371B5720E}"/>
+              </a:ext>
+            </a:extLst>
+          </p:cNvPr>
+          <p:cNvPicPr>
+            <a:picLocks noChangeAspect="1"/>
+          </p:cNvPicPr>
+          <p:nvPr/>
+        </p:nvPicPr>
+        <p:blipFill>
+          <a:blip r:embed="rId2"/>
+          <a:stretch>
+            <a:fillRect/>
+          </a:stretch>
+        </p:blipFill>
+        <p:spPr>
+          <a:xfrm>
+            <a:off x="7750628" y="2181470"/>
+            <a:ext cx="1622626" cy="4266710"/>
+          </a:xfrm>
+          <a:prstGeom prst="rect">
+            <a:avLst/>
+          </a:prstGeom>
+        </p:spPr>
+      </p:pic>
+      <p:pic>
+        <p:nvPicPr>
+          <p:cNvPr id="7" name="Picture 6">
+            <a:extLst>
+              <a:ext uri="{FF2B5EF4-FFF2-40B4-BE49-F238E27FC236}">
+                <a16:creationId xmlns:a16="http://schemas.microsoft.com/office/drawing/2014/main" id="{ABA7ED9C-B53D-4AC5-882A-A6173F2B0087}"/>
               </a:ext>
             </a:extLst>
           </p:cNvPr>
@@ -4289,25 +3843,20 @@
         </p:blipFill>
         <p:spPr>
           <a:xfrm>
-            <a:off x="4446019" y="4357434"/>
-            <a:ext cx="4563112" cy="1819529"/>
+            <a:off x="9844385" y="2135995"/>
+            <a:ext cx="1622626" cy="4312185"/>
           </a:xfrm>
           <a:prstGeom prst="rect">
             <a:avLst/>
           </a:prstGeom>
-          <a:ln>
-            <a:solidFill>
-              <a:schemeClr val="accent1"/>
-            </a:solidFill>
-          </a:ln>
         </p:spPr>
       </p:pic>
       <p:sp>
         <p:nvSpPr>
-          <p:cNvPr id="9" name="Content Placeholder 2">
-            <a:extLst>
-              <a:ext uri="{FF2B5EF4-FFF2-40B4-BE49-F238E27FC236}">
-                <a16:creationId xmlns:a16="http://schemas.microsoft.com/office/drawing/2014/main" id="{B672BB03-9C03-E63F-B460-53B0E3BAA60B}"/>
+          <p:cNvPr id="2" name="Title 5">
+            <a:extLst>
+              <a:ext uri="{FF2B5EF4-FFF2-40B4-BE49-F238E27FC236}">
+                <a16:creationId xmlns:a16="http://schemas.microsoft.com/office/drawing/2014/main" id="{7C4B3B28-8962-8CCA-3C81-5E4A09697222}"/>
               </a:ext>
             </a:extLst>
           </p:cNvPr>
@@ -4318,8 +3867,69 @@
         </p:nvSpPr>
         <p:spPr>
           <a:xfrm>
-            <a:off x="4446019" y="6174782"/>
-            <a:ext cx="7772922" cy="671195"/>
+            <a:off x="838200" y="306271"/>
+            <a:ext cx="10515600" cy="1006474"/>
+          </a:xfrm>
+          <a:prstGeom prst="rect">
+            <a:avLst/>
+          </a:prstGeom>
+        </p:spPr>
+        <p:txBody>
+          <a:bodyPr vert="horz" lIns="91440" tIns="45720" rIns="91440" bIns="45720" rtlCol="0" anchor="ctr">
+            <a:normAutofit fontScale="90000" lnSpcReduction="20000"/>
+          </a:bodyPr>
+          <a:lstStyle>
+            <a:lvl1pPr algn="l" defTabSz="914400" rtl="0" eaLnBrk="1" latinLnBrk="0" hangingPunct="1">
+              <a:lnSpc>
+                <a:spcPct val="90000"/>
+              </a:lnSpc>
+              <a:spcBef>
+                <a:spcPct val="0"/>
+              </a:spcBef>
+              <a:buNone/>
+              <a:defRPr sz="4400" kern="1200">
+                <a:solidFill>
+                  <a:schemeClr val="tx1"/>
+                </a:solidFill>
+                <a:latin typeface="+mj-lt"/>
+                <a:ea typeface="+mj-ea"/>
+                <a:cs typeface="+mj-cs"/>
+              </a:defRPr>
+            </a:lvl1pPr>
+          </a:lstStyle>
+          <a:p>
+            <a:r>
+              <a:rPr lang="en-CA"/>
+              <a:t>Meeting September 24, 2024</a:t>
+            </a:r>
+            <a:br>
+              <a:rPr lang="en-CA"/>
+            </a:br>
+            <a:r>
+              <a:rPr lang="en-CA"/>
+              <a:t>	</a:t>
+            </a:r>
+          </a:p>
+        </p:txBody>
+      </p:sp>
+      <p:sp>
+        <p:nvSpPr>
+          <p:cNvPr id="5" name="Content Placeholder 2">
+            <a:extLst>
+              <a:ext uri="{FF2B5EF4-FFF2-40B4-BE49-F238E27FC236}">
+                <a16:creationId xmlns:a16="http://schemas.microsoft.com/office/drawing/2014/main" id="{77E8E7ED-72A8-4254-BCF2-EB48EB64D02C}"/>
+              </a:ext>
+            </a:extLst>
+          </p:cNvPr>
+          <p:cNvSpPr txBox="1">
+            <a:spLocks/>
+          </p:cNvSpPr>
+          <p:nvPr/>
+        </p:nvSpPr>
+        <p:spPr>
+          <a:xfrm>
+            <a:off x="724989" y="893513"/>
+            <a:ext cx="6511834" cy="4351338"/>
           </a:xfrm>
           <a:prstGeom prst="rect">
             <a:avLst/>
@@ -4494,18 +4104,6 @@
             </a:lvl9pPr>
           </a:lstStyle>
           <a:p>
-            <a:pPr marL="0" indent="0">
-              <a:buFont typeface="Arial" panose="020B0604020202020204" pitchFamily="34" charset="0"/>
-              <a:buNone/>
-            </a:pPr>
-            <a:r>
-              <a:rPr lang="en-CA" sz="1800">
-                <a:solidFill>
-                  <a:srgbClr val="000000"/>
-                </a:solidFill>
-              </a:rPr>
-              <a:t>The MUT .eco file shows any defaults that have been reassigned.</a:t>
-            </a:r>
             <a:endParaRPr lang="en-CA"/>
           </a:p>
         </p:txBody>
@@ -4513,7 +4111,7 @@
     </p:spTree>
     <p:extLst>
       <p:ext uri="{BB962C8B-B14F-4D97-AF65-F5344CB8AC3E}">
-        <p14:creationId xmlns:p14="http://schemas.microsoft.com/office/powerpoint/2010/main" val="2264670390"/>
+        <p14:creationId xmlns:p14="http://schemas.microsoft.com/office/powerpoint/2010/main" val="1541341231"/>
       </p:ext>
     </p:extLst>
   </p:cSld>
@@ -4540,533 +4138,12 @@
           <a:chExt cx="0" cy="0"/>
         </a:xfrm>
       </p:grpSpPr>
-      <p:sp>
-        <p:nvSpPr>
-          <p:cNvPr id="2" name="Title 1">
-            <a:extLst>
-              <a:ext uri="{FF2B5EF4-FFF2-40B4-BE49-F238E27FC236}">
-                <a16:creationId xmlns:a16="http://schemas.microsoft.com/office/drawing/2014/main" id="{A24F867E-596F-0DE3-5A65-E9776ECDB27C}"/>
-              </a:ext>
-            </a:extLst>
-          </p:cNvPr>
-          <p:cNvSpPr>
-            <a:spLocks noGrp="1"/>
-          </p:cNvSpPr>
-          <p:nvPr>
-            <p:ph type="title"/>
-          </p:nvPr>
-        </p:nvSpPr>
-        <p:spPr>
-          <a:xfrm>
-            <a:off x="838200" y="138702"/>
-            <a:ext cx="10515600" cy="671195"/>
-          </a:xfrm>
-        </p:spPr>
-        <p:txBody>
-          <a:bodyPr>
-            <a:normAutofit/>
-          </a:bodyPr>
-          <a:lstStyle/>
-          <a:p>
-            <a:r>
-              <a:rPr lang="en-CA" sz="3600"/>
-              <a:t>GWF materials: unsaturated function type</a:t>
-            </a:r>
-          </a:p>
-        </p:txBody>
-      </p:sp>
-      <p:sp>
-        <p:nvSpPr>
-          <p:cNvPr id="6" name="Content Placeholder 2">
-            <a:extLst>
-              <a:ext uri="{FF2B5EF4-FFF2-40B4-BE49-F238E27FC236}">
-                <a16:creationId xmlns:a16="http://schemas.microsoft.com/office/drawing/2014/main" id="{197C7CF9-B3A6-2B28-00F8-65364FBEADB0}"/>
-              </a:ext>
-            </a:extLst>
-          </p:cNvPr>
-          <p:cNvSpPr txBox="1">
-            <a:spLocks/>
-          </p:cNvSpPr>
-          <p:nvPr/>
-        </p:nvSpPr>
-        <p:spPr>
-          <a:xfrm>
-            <a:off x="844784" y="2963997"/>
-            <a:ext cx="8699265" cy="671195"/>
-          </a:xfrm>
-          <a:prstGeom prst="rect">
-            <a:avLst/>
-          </a:prstGeom>
-        </p:spPr>
-        <p:txBody>
-          <a:bodyPr vert="horz" lIns="91440" tIns="45720" rIns="91440" bIns="45720" rtlCol="0">
-            <a:normAutofit/>
-          </a:bodyPr>
-          <a:lstStyle>
-            <a:lvl1pPr marL="228600" indent="-228600" algn="l" defTabSz="914400" rtl="0" eaLnBrk="1" latinLnBrk="0" hangingPunct="1">
-              <a:lnSpc>
-                <a:spcPct val="90000"/>
-              </a:lnSpc>
-              <a:spcBef>
-                <a:spcPts val="1000"/>
-              </a:spcBef>
-              <a:buFont typeface="Arial" panose="020B0604020202020204" pitchFamily="34" charset="0"/>
-              <a:buChar char="•"/>
-              <a:defRPr sz="2800" kern="1200">
-                <a:solidFill>
-                  <a:schemeClr val="tx1"/>
-                </a:solidFill>
-                <a:latin typeface="+mn-lt"/>
-                <a:ea typeface="+mn-ea"/>
-                <a:cs typeface="+mn-cs"/>
-              </a:defRPr>
-            </a:lvl1pPr>
-            <a:lvl2pPr marL="685800" indent="-228600" algn="l" defTabSz="914400" rtl="0" eaLnBrk="1" latinLnBrk="0" hangingPunct="1">
-              <a:lnSpc>
-                <a:spcPct val="90000"/>
-              </a:lnSpc>
-              <a:spcBef>
-                <a:spcPts val="500"/>
-              </a:spcBef>
-              <a:buFont typeface="Arial" panose="020B0604020202020204" pitchFamily="34" charset="0"/>
-              <a:buChar char="•"/>
-              <a:defRPr sz="2400" kern="1200">
-                <a:solidFill>
-                  <a:schemeClr val="tx1"/>
-                </a:solidFill>
-                <a:latin typeface="+mn-lt"/>
-                <a:ea typeface="+mn-ea"/>
-                <a:cs typeface="+mn-cs"/>
-              </a:defRPr>
-            </a:lvl2pPr>
-            <a:lvl3pPr marL="1143000" indent="-228600" algn="l" defTabSz="914400" rtl="0" eaLnBrk="1" latinLnBrk="0" hangingPunct="1">
-              <a:lnSpc>
-                <a:spcPct val="90000"/>
-              </a:lnSpc>
-              <a:spcBef>
-                <a:spcPts val="500"/>
-              </a:spcBef>
-              <a:buFont typeface="Arial" panose="020B0604020202020204" pitchFamily="34" charset="0"/>
-              <a:buChar char="•"/>
-              <a:defRPr sz="2000" kern="1200">
-                <a:solidFill>
-                  <a:schemeClr val="tx1"/>
-                </a:solidFill>
-                <a:latin typeface="+mn-lt"/>
-                <a:ea typeface="+mn-ea"/>
-                <a:cs typeface="+mn-cs"/>
-              </a:defRPr>
-            </a:lvl3pPr>
-            <a:lvl4pPr marL="1600200" indent="-228600" algn="l" defTabSz="914400" rtl="0" eaLnBrk="1" latinLnBrk="0" hangingPunct="1">
-              <a:lnSpc>
-                <a:spcPct val="90000"/>
-              </a:lnSpc>
-              <a:spcBef>
-                <a:spcPts val="500"/>
-              </a:spcBef>
-              <a:buFont typeface="Arial" panose="020B0604020202020204" pitchFamily="34" charset="0"/>
-              <a:buChar char="•"/>
-              <a:defRPr sz="1800" kern="1200">
-                <a:solidFill>
-                  <a:schemeClr val="tx1"/>
-                </a:solidFill>
-                <a:latin typeface="+mn-lt"/>
-                <a:ea typeface="+mn-ea"/>
-                <a:cs typeface="+mn-cs"/>
-              </a:defRPr>
-            </a:lvl4pPr>
-            <a:lvl5pPr marL="2057400" indent="-228600" algn="l" defTabSz="914400" rtl="0" eaLnBrk="1" latinLnBrk="0" hangingPunct="1">
-              <a:lnSpc>
-                <a:spcPct val="90000"/>
-              </a:lnSpc>
-              <a:spcBef>
-                <a:spcPts val="500"/>
-              </a:spcBef>
-              <a:buFont typeface="Arial" panose="020B0604020202020204" pitchFamily="34" charset="0"/>
-              <a:buChar char="•"/>
-              <a:defRPr sz="1800" kern="1200">
-                <a:solidFill>
-                  <a:schemeClr val="tx1"/>
-                </a:solidFill>
-                <a:latin typeface="+mn-lt"/>
-                <a:ea typeface="+mn-ea"/>
-                <a:cs typeface="+mn-cs"/>
-              </a:defRPr>
-            </a:lvl5pPr>
-            <a:lvl6pPr marL="2514600" indent="-228600" algn="l" defTabSz="914400" rtl="0" eaLnBrk="1" latinLnBrk="0" hangingPunct="1">
-              <a:lnSpc>
-                <a:spcPct val="90000"/>
-              </a:lnSpc>
-              <a:spcBef>
-                <a:spcPts val="500"/>
-              </a:spcBef>
-              <a:buFont typeface="Arial" panose="020B0604020202020204" pitchFamily="34" charset="0"/>
-              <a:buChar char="•"/>
-              <a:defRPr sz="1800" kern="1200">
-                <a:solidFill>
-                  <a:schemeClr val="tx1"/>
-                </a:solidFill>
-                <a:latin typeface="+mn-lt"/>
-                <a:ea typeface="+mn-ea"/>
-                <a:cs typeface="+mn-cs"/>
-              </a:defRPr>
-            </a:lvl6pPr>
-            <a:lvl7pPr marL="2971800" indent="-228600" algn="l" defTabSz="914400" rtl="0" eaLnBrk="1" latinLnBrk="0" hangingPunct="1">
-              <a:lnSpc>
-                <a:spcPct val="90000"/>
-              </a:lnSpc>
-              <a:spcBef>
-                <a:spcPts val="500"/>
-              </a:spcBef>
-              <a:buFont typeface="Arial" panose="020B0604020202020204" pitchFamily="34" charset="0"/>
-              <a:buChar char="•"/>
-              <a:defRPr sz="1800" kern="1200">
-                <a:solidFill>
-                  <a:schemeClr val="tx1"/>
-                </a:solidFill>
-                <a:latin typeface="+mn-lt"/>
-                <a:ea typeface="+mn-ea"/>
-                <a:cs typeface="+mn-cs"/>
-              </a:defRPr>
-            </a:lvl7pPr>
-            <a:lvl8pPr marL="3429000" indent="-228600" algn="l" defTabSz="914400" rtl="0" eaLnBrk="1" latinLnBrk="0" hangingPunct="1">
-              <a:lnSpc>
-                <a:spcPct val="90000"/>
-              </a:lnSpc>
-              <a:spcBef>
-                <a:spcPts val="500"/>
-              </a:spcBef>
-              <a:buFont typeface="Arial" panose="020B0604020202020204" pitchFamily="34" charset="0"/>
-              <a:buChar char="•"/>
-              <a:defRPr sz="1800" kern="1200">
-                <a:solidFill>
-                  <a:schemeClr val="tx1"/>
-                </a:solidFill>
-                <a:latin typeface="+mn-lt"/>
-                <a:ea typeface="+mn-ea"/>
-                <a:cs typeface="+mn-cs"/>
-              </a:defRPr>
-            </a:lvl8pPr>
-            <a:lvl9pPr marL="3886200" indent="-228600" algn="l" defTabSz="914400" rtl="0" eaLnBrk="1" latinLnBrk="0" hangingPunct="1">
-              <a:lnSpc>
-                <a:spcPct val="90000"/>
-              </a:lnSpc>
-              <a:spcBef>
-                <a:spcPts val="500"/>
-              </a:spcBef>
-              <a:buFont typeface="Arial" panose="020B0604020202020204" pitchFamily="34" charset="0"/>
-              <a:buChar char="•"/>
-              <a:defRPr sz="1800" kern="1200">
-                <a:solidFill>
-                  <a:schemeClr val="tx1"/>
-                </a:solidFill>
-                <a:latin typeface="+mn-lt"/>
-                <a:ea typeface="+mn-ea"/>
-                <a:cs typeface="+mn-cs"/>
-              </a:defRPr>
-            </a:lvl9pPr>
-          </a:lstStyle>
-          <a:p>
-            <a:pPr marL="0" marR="0" lvl="0" indent="0" algn="l" defTabSz="914400" rtl="0" eaLnBrk="1" fontAlgn="auto" latinLnBrk="0" hangingPunct="1">
-              <a:lnSpc>
-                <a:spcPct val="90000"/>
-              </a:lnSpc>
-              <a:spcBef>
-                <a:spcPts val="1000"/>
-              </a:spcBef>
-              <a:spcAft>
-                <a:spcPts val="0"/>
-              </a:spcAft>
-              <a:buClrTx/>
-              <a:buSzTx/>
-              <a:buFont typeface="Arial" panose="020B0604020202020204" pitchFamily="34" charset="0"/>
-              <a:buNone/>
-              <a:tabLst/>
-              <a:defRPr/>
-            </a:pPr>
-            <a:r>
-              <a:rPr kumimoji="0" lang="en-CA" sz="1800" b="0" i="0" u="none" strike="noStrike" kern="1200" cap="none" spc="0" normalizeH="0" baseline="0" noProof="0">
-                <a:ln>
-                  <a:noFill/>
-                </a:ln>
-                <a:solidFill>
-                  <a:srgbClr val="000000"/>
-                </a:solidFill>
-                <a:effectLst/>
-                <a:uLnTx/>
-                <a:uFillTx/>
-                <a:latin typeface="Calibri" panose="020F0502020204030204"/>
-                <a:ea typeface="+mn-ea"/>
-                <a:cs typeface="+mn-cs"/>
-              </a:rPr>
-              <a:t>Unsaturated function type is now chosen using a combo box in the GWF materials database form.   There is an additional input field for the Brooks-Corey Exponent. </a:t>
-            </a:r>
-            <a:endParaRPr kumimoji="0" lang="en-CA" sz="2800" b="0" i="0" u="none" strike="noStrike" kern="1200" cap="none" spc="0" normalizeH="0" baseline="0" noProof="0">
-              <a:ln>
-                <a:noFill/>
-              </a:ln>
-              <a:solidFill>
-                <a:prstClr val="black"/>
-              </a:solidFill>
-              <a:effectLst/>
-              <a:uLnTx/>
-              <a:uFillTx/>
-              <a:latin typeface="Calibri" panose="020F0502020204030204"/>
-              <a:ea typeface="+mn-ea"/>
-              <a:cs typeface="+mn-cs"/>
-            </a:endParaRPr>
-          </a:p>
-        </p:txBody>
-      </p:sp>
-      <p:sp>
-        <p:nvSpPr>
-          <p:cNvPr id="9" name="Content Placeholder 2">
-            <a:extLst>
-              <a:ext uri="{FF2B5EF4-FFF2-40B4-BE49-F238E27FC236}">
-                <a16:creationId xmlns:a16="http://schemas.microsoft.com/office/drawing/2014/main" id="{B672BB03-9C03-E63F-B460-53B0E3BAA60B}"/>
-              </a:ext>
-            </a:extLst>
-          </p:cNvPr>
-          <p:cNvSpPr txBox="1">
-            <a:spLocks/>
-          </p:cNvSpPr>
-          <p:nvPr/>
-        </p:nvSpPr>
-        <p:spPr>
-          <a:xfrm>
-            <a:off x="838200" y="5952853"/>
-            <a:ext cx="9106564" cy="671195"/>
-          </a:xfrm>
-          <a:prstGeom prst="rect">
-            <a:avLst/>
-          </a:prstGeom>
-        </p:spPr>
-        <p:txBody>
-          <a:bodyPr vert="horz" lIns="91440" tIns="45720" rIns="91440" bIns="45720" rtlCol="0">
-            <a:normAutofit/>
-          </a:bodyPr>
-          <a:lstStyle>
-            <a:lvl1pPr marL="228600" indent="-228600" algn="l" defTabSz="914400" rtl="0" eaLnBrk="1" latinLnBrk="0" hangingPunct="1">
-              <a:lnSpc>
-                <a:spcPct val="90000"/>
-              </a:lnSpc>
-              <a:spcBef>
-                <a:spcPts val="1000"/>
-              </a:spcBef>
-              <a:buFont typeface="Arial" panose="020B0604020202020204" pitchFamily="34" charset="0"/>
-              <a:buChar char="•"/>
-              <a:defRPr sz="2800" kern="1200">
-                <a:solidFill>
-                  <a:schemeClr val="tx1"/>
-                </a:solidFill>
-                <a:latin typeface="+mn-lt"/>
-                <a:ea typeface="+mn-ea"/>
-                <a:cs typeface="+mn-cs"/>
-              </a:defRPr>
-            </a:lvl1pPr>
-            <a:lvl2pPr marL="685800" indent="-228600" algn="l" defTabSz="914400" rtl="0" eaLnBrk="1" latinLnBrk="0" hangingPunct="1">
-              <a:lnSpc>
-                <a:spcPct val="90000"/>
-              </a:lnSpc>
-              <a:spcBef>
-                <a:spcPts val="500"/>
-              </a:spcBef>
-              <a:buFont typeface="Arial" panose="020B0604020202020204" pitchFamily="34" charset="0"/>
-              <a:buChar char="•"/>
-              <a:defRPr sz="2400" kern="1200">
-                <a:solidFill>
-                  <a:schemeClr val="tx1"/>
-                </a:solidFill>
-                <a:latin typeface="+mn-lt"/>
-                <a:ea typeface="+mn-ea"/>
-                <a:cs typeface="+mn-cs"/>
-              </a:defRPr>
-            </a:lvl2pPr>
-            <a:lvl3pPr marL="1143000" indent="-228600" algn="l" defTabSz="914400" rtl="0" eaLnBrk="1" latinLnBrk="0" hangingPunct="1">
-              <a:lnSpc>
-                <a:spcPct val="90000"/>
-              </a:lnSpc>
-              <a:spcBef>
-                <a:spcPts val="500"/>
-              </a:spcBef>
-              <a:buFont typeface="Arial" panose="020B0604020202020204" pitchFamily="34" charset="0"/>
-              <a:buChar char="•"/>
-              <a:defRPr sz="2000" kern="1200">
-                <a:solidFill>
-                  <a:schemeClr val="tx1"/>
-                </a:solidFill>
-                <a:latin typeface="+mn-lt"/>
-                <a:ea typeface="+mn-ea"/>
-                <a:cs typeface="+mn-cs"/>
-              </a:defRPr>
-            </a:lvl3pPr>
-            <a:lvl4pPr marL="1600200" indent="-228600" algn="l" defTabSz="914400" rtl="0" eaLnBrk="1" latinLnBrk="0" hangingPunct="1">
-              <a:lnSpc>
-                <a:spcPct val="90000"/>
-              </a:lnSpc>
-              <a:spcBef>
-                <a:spcPts val="500"/>
-              </a:spcBef>
-              <a:buFont typeface="Arial" panose="020B0604020202020204" pitchFamily="34" charset="0"/>
-              <a:buChar char="•"/>
-              <a:defRPr sz="1800" kern="1200">
-                <a:solidFill>
-                  <a:schemeClr val="tx1"/>
-                </a:solidFill>
-                <a:latin typeface="+mn-lt"/>
-                <a:ea typeface="+mn-ea"/>
-                <a:cs typeface="+mn-cs"/>
-              </a:defRPr>
-            </a:lvl4pPr>
-            <a:lvl5pPr marL="2057400" indent="-228600" algn="l" defTabSz="914400" rtl="0" eaLnBrk="1" latinLnBrk="0" hangingPunct="1">
-              <a:lnSpc>
-                <a:spcPct val="90000"/>
-              </a:lnSpc>
-              <a:spcBef>
-                <a:spcPts val="500"/>
-              </a:spcBef>
-              <a:buFont typeface="Arial" panose="020B0604020202020204" pitchFamily="34" charset="0"/>
-              <a:buChar char="•"/>
-              <a:defRPr sz="1800" kern="1200">
-                <a:solidFill>
-                  <a:schemeClr val="tx1"/>
-                </a:solidFill>
-                <a:latin typeface="+mn-lt"/>
-                <a:ea typeface="+mn-ea"/>
-                <a:cs typeface="+mn-cs"/>
-              </a:defRPr>
-            </a:lvl5pPr>
-            <a:lvl6pPr marL="2514600" indent="-228600" algn="l" defTabSz="914400" rtl="0" eaLnBrk="1" latinLnBrk="0" hangingPunct="1">
-              <a:lnSpc>
-                <a:spcPct val="90000"/>
-              </a:lnSpc>
-              <a:spcBef>
-                <a:spcPts val="500"/>
-              </a:spcBef>
-              <a:buFont typeface="Arial" panose="020B0604020202020204" pitchFamily="34" charset="0"/>
-              <a:buChar char="•"/>
-              <a:defRPr sz="1800" kern="1200">
-                <a:solidFill>
-                  <a:schemeClr val="tx1"/>
-                </a:solidFill>
-                <a:latin typeface="+mn-lt"/>
-                <a:ea typeface="+mn-ea"/>
-                <a:cs typeface="+mn-cs"/>
-              </a:defRPr>
-            </a:lvl6pPr>
-            <a:lvl7pPr marL="2971800" indent="-228600" algn="l" defTabSz="914400" rtl="0" eaLnBrk="1" latinLnBrk="0" hangingPunct="1">
-              <a:lnSpc>
-                <a:spcPct val="90000"/>
-              </a:lnSpc>
-              <a:spcBef>
-                <a:spcPts val="500"/>
-              </a:spcBef>
-              <a:buFont typeface="Arial" panose="020B0604020202020204" pitchFamily="34" charset="0"/>
-              <a:buChar char="•"/>
-              <a:defRPr sz="1800" kern="1200">
-                <a:solidFill>
-                  <a:schemeClr val="tx1"/>
-                </a:solidFill>
-                <a:latin typeface="+mn-lt"/>
-                <a:ea typeface="+mn-ea"/>
-                <a:cs typeface="+mn-cs"/>
-              </a:defRPr>
-            </a:lvl7pPr>
-            <a:lvl8pPr marL="3429000" indent="-228600" algn="l" defTabSz="914400" rtl="0" eaLnBrk="1" latinLnBrk="0" hangingPunct="1">
-              <a:lnSpc>
-                <a:spcPct val="90000"/>
-              </a:lnSpc>
-              <a:spcBef>
-                <a:spcPts val="500"/>
-              </a:spcBef>
-              <a:buFont typeface="Arial" panose="020B0604020202020204" pitchFamily="34" charset="0"/>
-              <a:buChar char="•"/>
-              <a:defRPr sz="1800" kern="1200">
-                <a:solidFill>
-                  <a:schemeClr val="tx1"/>
-                </a:solidFill>
-                <a:latin typeface="+mn-lt"/>
-                <a:ea typeface="+mn-ea"/>
-                <a:cs typeface="+mn-cs"/>
-              </a:defRPr>
-            </a:lvl8pPr>
-            <a:lvl9pPr marL="3886200" indent="-228600" algn="l" defTabSz="914400" rtl="0" eaLnBrk="1" latinLnBrk="0" hangingPunct="1">
-              <a:lnSpc>
-                <a:spcPct val="90000"/>
-              </a:lnSpc>
-              <a:spcBef>
-                <a:spcPts val="500"/>
-              </a:spcBef>
-              <a:buFont typeface="Arial" panose="020B0604020202020204" pitchFamily="34" charset="0"/>
-              <a:buChar char="•"/>
-              <a:defRPr sz="1800" kern="1200">
-                <a:solidFill>
-                  <a:schemeClr val="tx1"/>
-                </a:solidFill>
-                <a:latin typeface="+mn-lt"/>
-                <a:ea typeface="+mn-ea"/>
-                <a:cs typeface="+mn-cs"/>
-              </a:defRPr>
-            </a:lvl9pPr>
-          </a:lstStyle>
-          <a:p>
-            <a:pPr marL="0" marR="0" lvl="0" indent="0" algn="l" defTabSz="914400" rtl="0" eaLnBrk="1" fontAlgn="auto" latinLnBrk="0" hangingPunct="1">
-              <a:lnSpc>
-                <a:spcPct val="90000"/>
-              </a:lnSpc>
-              <a:spcBef>
-                <a:spcPts val="1000"/>
-              </a:spcBef>
-              <a:spcAft>
-                <a:spcPts val="0"/>
-              </a:spcAft>
-              <a:buClrTx/>
-              <a:buSzTx/>
-              <a:buFont typeface="Arial" panose="020B0604020202020204" pitchFamily="34" charset="0"/>
-              <a:buNone/>
-              <a:tabLst/>
-              <a:defRPr/>
-            </a:pPr>
-            <a:r>
-              <a:rPr kumimoji="0" lang="en-CA" sz="1800" b="0" i="0" u="none" strike="noStrike" kern="1200" cap="none" spc="0" normalizeH="0" baseline="0" noProof="0">
-                <a:ln>
-                  <a:noFill/>
-                </a:ln>
-                <a:solidFill>
-                  <a:srgbClr val="000000"/>
-                </a:solidFill>
-                <a:effectLst/>
-                <a:uLnTx/>
-                <a:uFillTx/>
-                <a:latin typeface="Calibri" panose="020F0502020204030204"/>
-                <a:ea typeface="+mn-ea"/>
-                <a:cs typeface="+mn-cs"/>
-              </a:rPr>
-              <a:t>If the Unsaturated function type is set to Brooks-Corey, the MUT .eco file also shows the Brooks-Corey exponent value</a:t>
-            </a:r>
-            <a:endParaRPr kumimoji="0" lang="en-CA" sz="2800" b="0" i="0" u="none" strike="noStrike" kern="1200" cap="none" spc="0" normalizeH="0" baseline="0" noProof="0">
-              <a:ln>
-                <a:noFill/>
-              </a:ln>
-              <a:solidFill>
-                <a:prstClr val="black"/>
-              </a:solidFill>
-              <a:effectLst/>
-              <a:uLnTx/>
-              <a:uFillTx/>
-              <a:latin typeface="Calibri" panose="020F0502020204030204"/>
-              <a:ea typeface="+mn-ea"/>
-              <a:cs typeface="+mn-cs"/>
-            </a:endParaRPr>
-          </a:p>
-        </p:txBody>
-      </p:sp>
       <p:pic>
         <p:nvPicPr>
-          <p:cNvPr id="13" name="Picture 12">
-            <a:extLst>
-              <a:ext uri="{FF2B5EF4-FFF2-40B4-BE49-F238E27FC236}">
-                <a16:creationId xmlns:a16="http://schemas.microsoft.com/office/drawing/2014/main" id="{1532FA25-3C1D-8315-6803-1C327DFDCE6F}"/>
+          <p:cNvPr id="5" name="Picture 4">
+            <a:extLst>
+              <a:ext uri="{FF2B5EF4-FFF2-40B4-BE49-F238E27FC236}">
+                <a16:creationId xmlns:a16="http://schemas.microsoft.com/office/drawing/2014/main" id="{3CB7E1AE-C049-1A19-97A4-1698ABA793C8}"/>
               </a:ext>
             </a:extLst>
           </p:cNvPr>
@@ -5083,58 +4160,103 @@
         </p:blipFill>
         <p:spPr>
           <a:xfrm>
-            <a:off x="923330" y="3664921"/>
-            <a:ext cx="9021434" cy="2124371"/>
+            <a:off x="2235093" y="1971675"/>
+            <a:ext cx="7721813" cy="4666977"/>
           </a:xfrm>
           <a:prstGeom prst="rect">
             <a:avLst/>
           </a:prstGeom>
-          <a:ln>
-            <a:solidFill>
-              <a:schemeClr val="accent1"/>
-            </a:solidFill>
-          </a:ln>
         </p:spPr>
       </p:pic>
-      <p:pic>
-        <p:nvPicPr>
-          <p:cNvPr id="15" name="Picture 14">
-            <a:extLst>
-              <a:ext uri="{FF2B5EF4-FFF2-40B4-BE49-F238E27FC236}">
-                <a16:creationId xmlns:a16="http://schemas.microsoft.com/office/drawing/2014/main" id="{E62282EB-884B-3357-2BC4-9DD6D5605A6E}"/>
-              </a:ext>
-            </a:extLst>
-          </p:cNvPr>
-          <p:cNvPicPr>
-            <a:picLocks noChangeAspect="1"/>
-          </p:cNvPicPr>
-          <p:nvPr/>
-        </p:nvPicPr>
-        <p:blipFill>
-          <a:blip r:embed="rId3"/>
-          <a:stretch>
-            <a:fillRect/>
-          </a:stretch>
-        </p:blipFill>
+      <p:sp>
+        <p:nvSpPr>
+          <p:cNvPr id="6" name="Title 5">
+            <a:extLst>
+              <a:ext uri="{FF2B5EF4-FFF2-40B4-BE49-F238E27FC236}">
+                <a16:creationId xmlns:a16="http://schemas.microsoft.com/office/drawing/2014/main" id="{1F6A9C80-92BE-94DF-D7F9-7B11618B934E}"/>
+              </a:ext>
+            </a:extLst>
+          </p:cNvPr>
+          <p:cNvSpPr>
+            <a:spLocks noGrp="1"/>
+          </p:cNvSpPr>
+          <p:nvPr>
+            <p:ph type="title"/>
+          </p:nvPr>
+        </p:nvSpPr>
         <p:spPr>
           <a:xfrm>
-            <a:off x="923330" y="1101825"/>
-            <a:ext cx="8326012" cy="1829055"/>
+            <a:off x="838200" y="365126"/>
+            <a:ext cx="10515600" cy="1006474"/>
           </a:xfrm>
-          <a:prstGeom prst="rect">
-            <a:avLst/>
-          </a:prstGeom>
-          <a:ln>
-            <a:solidFill>
-              <a:schemeClr val="accent1"/>
-            </a:solidFill>
-          </a:ln>
         </p:spPr>
-      </p:pic>
+        <p:txBody>
+          <a:bodyPr>
+            <a:normAutofit fontScale="90000"/>
+          </a:bodyPr>
+          <a:lstStyle/>
+          <a:p>
+            <a:r>
+              <a:rPr lang="en-CA" sz="4000" b="1"/>
+              <a:t>Example</a:t>
+            </a:r>
+            <a:r>
+              <a:rPr lang="en-CA" sz="4400" b="1"/>
+              <a:t> </a:t>
+            </a:r>
+            <a:r>
+              <a:rPr lang="en-CA" sz="4000" b="1"/>
+              <a:t>4_SWF_RCH_CRD</a:t>
+            </a:r>
+            <a:br>
+              <a:rPr lang="en-CA"/>
+            </a:br>
+            <a:r>
+              <a:rPr lang="en-CA"/>
+              <a:t>	</a:t>
+            </a:r>
+          </a:p>
+        </p:txBody>
+      </p:sp>
+      <p:sp>
+        <p:nvSpPr>
+          <p:cNvPr id="3" name="Content Placeholder 2">
+            <a:extLst>
+              <a:ext uri="{FF2B5EF4-FFF2-40B4-BE49-F238E27FC236}">
+                <a16:creationId xmlns:a16="http://schemas.microsoft.com/office/drawing/2014/main" id="{80D5D497-50BE-4DAA-9F47-78F040A65205}"/>
+              </a:ext>
+            </a:extLst>
+          </p:cNvPr>
+          <p:cNvSpPr>
+            <a:spLocks noGrp="1"/>
+          </p:cNvSpPr>
+          <p:nvPr>
+            <p:ph idx="1"/>
+          </p:nvPr>
+        </p:nvSpPr>
+        <p:spPr>
+          <a:xfrm>
+            <a:off x="838200" y="1371600"/>
+            <a:ext cx="10515600" cy="4351338"/>
+          </a:xfrm>
+        </p:spPr>
+        <p:txBody>
+          <a:bodyPr>
+            <a:normAutofit/>
+          </a:bodyPr>
+          <a:lstStyle/>
+          <a:p>
+            <a:r>
+              <a:rPr lang="en-CA" sz="2000"/>
+              <a:t>My version isn’t set up right yet.  Young-Jin: we need to check units, input values etc.  </a:t>
+            </a:r>
+          </a:p>
+        </p:txBody>
+      </p:sp>
     </p:spTree>
     <p:extLst>
       <p:ext uri="{BB962C8B-B14F-4D97-AF65-F5344CB8AC3E}">
-        <p14:creationId xmlns:p14="http://schemas.microsoft.com/office/powerpoint/2010/main" val="4160721040"/>
+        <p14:creationId xmlns:p14="http://schemas.microsoft.com/office/powerpoint/2010/main" val="2073786350"/>
       </p:ext>
     </p:extLst>
   </p:cSld>
@@ -5161,12 +4283,125 @@
           <a:chExt cx="0" cy="0"/>
         </a:xfrm>
       </p:grpSpPr>
+      <p:sp>
+        <p:nvSpPr>
+          <p:cNvPr id="2" name="Title 1">
+            <a:extLst>
+              <a:ext uri="{FF2B5EF4-FFF2-40B4-BE49-F238E27FC236}">
+                <a16:creationId xmlns:a16="http://schemas.microsoft.com/office/drawing/2014/main" id="{A24F867E-596F-0DE3-5A65-E9776ECDB27C}"/>
+              </a:ext>
+            </a:extLst>
+          </p:cNvPr>
+          <p:cNvSpPr>
+            <a:spLocks noGrp="1"/>
+          </p:cNvSpPr>
+          <p:nvPr>
+            <p:ph type="title"/>
+          </p:nvPr>
+        </p:nvSpPr>
+        <p:spPr>
+          <a:xfrm>
+            <a:off x="838200" y="138702"/>
+            <a:ext cx="10515600" cy="671195"/>
+          </a:xfrm>
+        </p:spPr>
+        <p:txBody>
+          <a:bodyPr>
+            <a:normAutofit fontScale="90000"/>
+          </a:bodyPr>
+          <a:lstStyle/>
+          <a:p>
+            <a:r>
+              <a:rPr lang="en-CA"/>
+              <a:t>Units Instructions</a:t>
+            </a:r>
+          </a:p>
+        </p:txBody>
+      </p:sp>
+      <p:sp>
+        <p:nvSpPr>
+          <p:cNvPr id="3" name="Content Placeholder 2">
+            <a:extLst>
+              <a:ext uri="{FF2B5EF4-FFF2-40B4-BE49-F238E27FC236}">
+                <a16:creationId xmlns:a16="http://schemas.microsoft.com/office/drawing/2014/main" id="{07D9778E-4374-8A29-D999-DB990900AE2B}"/>
+              </a:ext>
+            </a:extLst>
+          </p:cNvPr>
+          <p:cNvSpPr>
+            <a:spLocks noGrp="1"/>
+          </p:cNvSpPr>
+          <p:nvPr>
+            <p:ph idx="1"/>
+          </p:nvPr>
+        </p:nvSpPr>
+        <p:spPr>
+          <a:xfrm>
+            <a:off x="769368" y="989782"/>
+            <a:ext cx="6393431" cy="5367066"/>
+          </a:xfrm>
+        </p:spPr>
+        <p:txBody>
+          <a:bodyPr>
+            <a:noAutofit/>
+          </a:bodyPr>
+          <a:lstStyle/>
+          <a:p>
+            <a:r>
+              <a:rPr lang="en-CA" sz="2400">
+                <a:solidFill>
+                  <a:srgbClr val="000000"/>
+                </a:solidFill>
+              </a:rPr>
+              <a:t>Up to now MUT assigned seconds and meters as the default units with no user control </a:t>
+            </a:r>
+          </a:p>
+          <a:p>
+            <a:r>
+              <a:rPr lang="en-CA" sz="2400">
+                <a:solidFill>
+                  <a:srgbClr val="000000"/>
+                </a:solidFill>
+              </a:rPr>
+              <a:t>These instructions currently just define the definitions written to the .DIS file but could: </a:t>
+            </a:r>
+          </a:p>
+          <a:p>
+            <a:pPr lvl="1"/>
+            <a:r>
+              <a:rPr lang="en-CA">
+                <a:solidFill>
+                  <a:srgbClr val="000000"/>
+                </a:solidFill>
+              </a:rPr>
+              <a:t>Be used to check input units e.g. if GWF database had a time and length units column for each record  they could be converted as required.</a:t>
+            </a:r>
+          </a:p>
+          <a:p>
+            <a:pPr lvl="1"/>
+            <a:r>
+              <a:rPr lang="en-CA">
+                <a:solidFill>
+                  <a:srgbClr val="000000"/>
+                </a:solidFill>
+              </a:rPr>
+              <a:t>Convert constants e.g. grav etc.</a:t>
+            </a:r>
+          </a:p>
+          <a:p>
+            <a:endParaRPr lang="en-CA" sz="2400">
+              <a:solidFill>
+                <a:srgbClr val="000000"/>
+              </a:solidFill>
+            </a:endParaRPr>
+          </a:p>
+        </p:txBody>
+      </p:sp>
       <p:pic>
         <p:nvPicPr>
-          <p:cNvPr id="11" name="Picture 10">
-            <a:extLst>
-              <a:ext uri="{FF2B5EF4-FFF2-40B4-BE49-F238E27FC236}">
-                <a16:creationId xmlns:a16="http://schemas.microsoft.com/office/drawing/2014/main" id="{733686BB-6139-2860-A119-825C9300E3BA}"/>
+          <p:cNvPr id="7" name="Picture 6">
+            <a:extLst>
+              <a:ext uri="{FF2B5EF4-FFF2-40B4-BE49-F238E27FC236}">
+                <a16:creationId xmlns:a16="http://schemas.microsoft.com/office/drawing/2014/main" id="{8143BB5A-24A8-98FA-1277-26EBC33BD499}"/>
               </a:ext>
             </a:extLst>
           </p:cNvPr>
@@ -5183,8 +4418,8 @@
         </p:blipFill>
         <p:spPr>
           <a:xfrm>
-            <a:off x="747323" y="3307347"/>
-            <a:ext cx="8707065" cy="3010320"/>
+            <a:off x="7457757" y="2477604"/>
+            <a:ext cx="2295845" cy="1143160"/>
           </a:xfrm>
           <a:prstGeom prst="rect">
             <a:avLst/>
@@ -5196,1510 +4431,10 @@
           </a:ln>
         </p:spPr>
       </p:pic>
-      <p:sp>
-        <p:nvSpPr>
-          <p:cNvPr id="2" name="Title 1">
-            <a:extLst>
-              <a:ext uri="{FF2B5EF4-FFF2-40B4-BE49-F238E27FC236}">
-                <a16:creationId xmlns:a16="http://schemas.microsoft.com/office/drawing/2014/main" id="{8E61C0C6-328A-9C80-C06A-4E77F1B9B202}"/>
-              </a:ext>
-            </a:extLst>
-          </p:cNvPr>
-          <p:cNvSpPr>
-            <a:spLocks noGrp="1"/>
-          </p:cNvSpPr>
-          <p:nvPr>
-            <p:ph type="title"/>
-          </p:nvPr>
-        </p:nvSpPr>
-        <p:spPr>
-          <a:xfrm>
-            <a:off x="771525" y="174626"/>
-            <a:ext cx="10515600" cy="692150"/>
-          </a:xfrm>
-        </p:spPr>
-        <p:txBody>
-          <a:bodyPr>
-            <a:normAutofit fontScale="90000"/>
-          </a:bodyPr>
-          <a:lstStyle/>
-          <a:p>
-            <a:r>
-              <a:rPr lang="en-CA"/>
-              <a:t>Materials database values</a:t>
-            </a:r>
-          </a:p>
-        </p:txBody>
-      </p:sp>
-      <p:pic>
-        <p:nvPicPr>
-          <p:cNvPr id="5" name="Content Placeholder 4">
-            <a:extLst>
-              <a:ext uri="{FF2B5EF4-FFF2-40B4-BE49-F238E27FC236}">
-                <a16:creationId xmlns:a16="http://schemas.microsoft.com/office/drawing/2014/main" id="{AAC29390-1F1F-0550-FC9F-8F1AB119694D}"/>
-              </a:ext>
-            </a:extLst>
-          </p:cNvPr>
-          <p:cNvPicPr>
-            <a:picLocks noGrp="1" noChangeAspect="1"/>
-          </p:cNvPicPr>
-          <p:nvPr>
-            <p:ph idx="1"/>
-          </p:nvPr>
-        </p:nvPicPr>
-        <p:blipFill>
-          <a:blip r:embed="rId3"/>
-          <a:stretch>
-            <a:fillRect/>
-          </a:stretch>
-        </p:blipFill>
-        <p:spPr>
-          <a:xfrm>
-            <a:off x="747323" y="1007156"/>
-            <a:ext cx="5572903" cy="1609950"/>
-          </a:xfrm>
-          <a:prstGeom prst="rect">
-            <a:avLst/>
-          </a:prstGeom>
-          <a:ln>
-            <a:solidFill>
-              <a:schemeClr val="accent1"/>
-            </a:solidFill>
-          </a:ln>
-        </p:spPr>
-      </p:pic>
-      <p:sp>
-        <p:nvSpPr>
-          <p:cNvPr id="8" name="Content Placeholder 2">
-            <a:extLst>
-              <a:ext uri="{FF2B5EF4-FFF2-40B4-BE49-F238E27FC236}">
-                <a16:creationId xmlns:a16="http://schemas.microsoft.com/office/drawing/2014/main" id="{779926FA-996A-EF20-D2A4-31B18F8DB079}"/>
-              </a:ext>
-            </a:extLst>
-          </p:cNvPr>
-          <p:cNvSpPr txBox="1">
-            <a:spLocks/>
-          </p:cNvSpPr>
-          <p:nvPr/>
-        </p:nvSpPr>
-        <p:spPr>
-          <a:xfrm>
-            <a:off x="747323" y="2634111"/>
-            <a:ext cx="5572904" cy="671195"/>
-          </a:xfrm>
-          <a:prstGeom prst="rect">
-            <a:avLst/>
-          </a:prstGeom>
-        </p:spPr>
-        <p:txBody>
-          <a:bodyPr vert="horz" lIns="91440" tIns="45720" rIns="91440" bIns="45720" rtlCol="0">
-            <a:normAutofit fontScale="92500"/>
-          </a:bodyPr>
-          <a:lstStyle>
-            <a:lvl1pPr marL="228600" indent="-228600" algn="l" defTabSz="914400" rtl="0" eaLnBrk="1" latinLnBrk="0" hangingPunct="1">
-              <a:lnSpc>
-                <a:spcPct val="90000"/>
-              </a:lnSpc>
-              <a:spcBef>
-                <a:spcPts val="1000"/>
-              </a:spcBef>
-              <a:buFont typeface="Arial" panose="020B0604020202020204" pitchFamily="34" charset="0"/>
-              <a:buChar char="•"/>
-              <a:defRPr sz="2800" kern="1200">
-                <a:solidFill>
-                  <a:schemeClr val="tx1"/>
-                </a:solidFill>
-                <a:latin typeface="+mn-lt"/>
-                <a:ea typeface="+mn-ea"/>
-                <a:cs typeface="+mn-cs"/>
-              </a:defRPr>
-            </a:lvl1pPr>
-            <a:lvl2pPr marL="685800" indent="-228600" algn="l" defTabSz="914400" rtl="0" eaLnBrk="1" latinLnBrk="0" hangingPunct="1">
-              <a:lnSpc>
-                <a:spcPct val="90000"/>
-              </a:lnSpc>
-              <a:spcBef>
-                <a:spcPts val="500"/>
-              </a:spcBef>
-              <a:buFont typeface="Arial" panose="020B0604020202020204" pitchFamily="34" charset="0"/>
-              <a:buChar char="•"/>
-              <a:defRPr sz="2400" kern="1200">
-                <a:solidFill>
-                  <a:schemeClr val="tx1"/>
-                </a:solidFill>
-                <a:latin typeface="+mn-lt"/>
-                <a:ea typeface="+mn-ea"/>
-                <a:cs typeface="+mn-cs"/>
-              </a:defRPr>
-            </a:lvl2pPr>
-            <a:lvl3pPr marL="1143000" indent="-228600" algn="l" defTabSz="914400" rtl="0" eaLnBrk="1" latinLnBrk="0" hangingPunct="1">
-              <a:lnSpc>
-                <a:spcPct val="90000"/>
-              </a:lnSpc>
-              <a:spcBef>
-                <a:spcPts val="500"/>
-              </a:spcBef>
-              <a:buFont typeface="Arial" panose="020B0604020202020204" pitchFamily="34" charset="0"/>
-              <a:buChar char="•"/>
-              <a:defRPr sz="2000" kern="1200">
-                <a:solidFill>
-                  <a:schemeClr val="tx1"/>
-                </a:solidFill>
-                <a:latin typeface="+mn-lt"/>
-                <a:ea typeface="+mn-ea"/>
-                <a:cs typeface="+mn-cs"/>
-              </a:defRPr>
-            </a:lvl3pPr>
-            <a:lvl4pPr marL="1600200" indent="-228600" algn="l" defTabSz="914400" rtl="0" eaLnBrk="1" latinLnBrk="0" hangingPunct="1">
-              <a:lnSpc>
-                <a:spcPct val="90000"/>
-              </a:lnSpc>
-              <a:spcBef>
-                <a:spcPts val="500"/>
-              </a:spcBef>
-              <a:buFont typeface="Arial" panose="020B0604020202020204" pitchFamily="34" charset="0"/>
-              <a:buChar char="•"/>
-              <a:defRPr sz="1800" kern="1200">
-                <a:solidFill>
-                  <a:schemeClr val="tx1"/>
-                </a:solidFill>
-                <a:latin typeface="+mn-lt"/>
-                <a:ea typeface="+mn-ea"/>
-                <a:cs typeface="+mn-cs"/>
-              </a:defRPr>
-            </a:lvl4pPr>
-            <a:lvl5pPr marL="2057400" indent="-228600" algn="l" defTabSz="914400" rtl="0" eaLnBrk="1" latinLnBrk="0" hangingPunct="1">
-              <a:lnSpc>
-                <a:spcPct val="90000"/>
-              </a:lnSpc>
-              <a:spcBef>
-                <a:spcPts val="500"/>
-              </a:spcBef>
-              <a:buFont typeface="Arial" panose="020B0604020202020204" pitchFamily="34" charset="0"/>
-              <a:buChar char="•"/>
-              <a:defRPr sz="1800" kern="1200">
-                <a:solidFill>
-                  <a:schemeClr val="tx1"/>
-                </a:solidFill>
-                <a:latin typeface="+mn-lt"/>
-                <a:ea typeface="+mn-ea"/>
-                <a:cs typeface="+mn-cs"/>
-              </a:defRPr>
-            </a:lvl5pPr>
-            <a:lvl6pPr marL="2514600" indent="-228600" algn="l" defTabSz="914400" rtl="0" eaLnBrk="1" latinLnBrk="0" hangingPunct="1">
-              <a:lnSpc>
-                <a:spcPct val="90000"/>
-              </a:lnSpc>
-              <a:spcBef>
-                <a:spcPts val="500"/>
-              </a:spcBef>
-              <a:buFont typeface="Arial" panose="020B0604020202020204" pitchFamily="34" charset="0"/>
-              <a:buChar char="•"/>
-              <a:defRPr sz="1800" kern="1200">
-                <a:solidFill>
-                  <a:schemeClr val="tx1"/>
-                </a:solidFill>
-                <a:latin typeface="+mn-lt"/>
-                <a:ea typeface="+mn-ea"/>
-                <a:cs typeface="+mn-cs"/>
-              </a:defRPr>
-            </a:lvl6pPr>
-            <a:lvl7pPr marL="2971800" indent="-228600" algn="l" defTabSz="914400" rtl="0" eaLnBrk="1" latinLnBrk="0" hangingPunct="1">
-              <a:lnSpc>
-                <a:spcPct val="90000"/>
-              </a:lnSpc>
-              <a:spcBef>
-                <a:spcPts val="500"/>
-              </a:spcBef>
-              <a:buFont typeface="Arial" panose="020B0604020202020204" pitchFamily="34" charset="0"/>
-              <a:buChar char="•"/>
-              <a:defRPr sz="1800" kern="1200">
-                <a:solidFill>
-                  <a:schemeClr val="tx1"/>
-                </a:solidFill>
-                <a:latin typeface="+mn-lt"/>
-                <a:ea typeface="+mn-ea"/>
-                <a:cs typeface="+mn-cs"/>
-              </a:defRPr>
-            </a:lvl7pPr>
-            <a:lvl8pPr marL="3429000" indent="-228600" algn="l" defTabSz="914400" rtl="0" eaLnBrk="1" latinLnBrk="0" hangingPunct="1">
-              <a:lnSpc>
-                <a:spcPct val="90000"/>
-              </a:lnSpc>
-              <a:spcBef>
-                <a:spcPts val="500"/>
-              </a:spcBef>
-              <a:buFont typeface="Arial" panose="020B0604020202020204" pitchFamily="34" charset="0"/>
-              <a:buChar char="•"/>
-              <a:defRPr sz="1800" kern="1200">
-                <a:solidFill>
-                  <a:schemeClr val="tx1"/>
-                </a:solidFill>
-                <a:latin typeface="+mn-lt"/>
-                <a:ea typeface="+mn-ea"/>
-                <a:cs typeface="+mn-cs"/>
-              </a:defRPr>
-            </a:lvl8pPr>
-            <a:lvl9pPr marL="3886200" indent="-228600" algn="l" defTabSz="914400" rtl="0" eaLnBrk="1" latinLnBrk="0" hangingPunct="1">
-              <a:lnSpc>
-                <a:spcPct val="90000"/>
-              </a:lnSpc>
-              <a:spcBef>
-                <a:spcPts val="500"/>
-              </a:spcBef>
-              <a:buFont typeface="Arial" panose="020B0604020202020204" pitchFamily="34" charset="0"/>
-              <a:buChar char="•"/>
-              <a:defRPr sz="1800" kern="1200">
-                <a:solidFill>
-                  <a:schemeClr val="tx1"/>
-                </a:solidFill>
-                <a:latin typeface="+mn-lt"/>
-                <a:ea typeface="+mn-ea"/>
-                <a:cs typeface="+mn-cs"/>
-              </a:defRPr>
-            </a:lvl9pPr>
-          </a:lstStyle>
-          <a:p>
-            <a:pPr marL="0" indent="0">
-              <a:buFont typeface="Arial" panose="020B0604020202020204" pitchFamily="34" charset="0"/>
-              <a:buNone/>
-            </a:pPr>
-            <a:r>
-              <a:rPr lang="en-CA" sz="1800">
-                <a:solidFill>
-                  <a:srgbClr val="000000"/>
-                </a:solidFill>
-              </a:rPr>
-              <a:t>Material property values (e.g. Kh, Kv etc) can be defined in the MUT input .mut file as shown here for the GWF domain. </a:t>
-            </a:r>
-            <a:endParaRPr lang="en-CA"/>
-          </a:p>
-        </p:txBody>
-      </p:sp>
-      <p:sp>
-        <p:nvSpPr>
-          <p:cNvPr id="9" name="Content Placeholder 2">
-            <a:extLst>
-              <a:ext uri="{FF2B5EF4-FFF2-40B4-BE49-F238E27FC236}">
-                <a16:creationId xmlns:a16="http://schemas.microsoft.com/office/drawing/2014/main" id="{A9010BEC-514C-DB5C-8FB4-E255ACD765F4}"/>
-              </a:ext>
-            </a:extLst>
-          </p:cNvPr>
-          <p:cNvSpPr txBox="1">
-            <a:spLocks/>
-          </p:cNvSpPr>
-          <p:nvPr/>
-        </p:nvSpPr>
-        <p:spPr>
-          <a:xfrm>
-            <a:off x="619125" y="6336713"/>
-            <a:ext cx="7772922" cy="671195"/>
-          </a:xfrm>
-          <a:prstGeom prst="rect">
-            <a:avLst/>
-          </a:prstGeom>
-        </p:spPr>
-        <p:txBody>
-          <a:bodyPr vert="horz" lIns="91440" tIns="45720" rIns="91440" bIns="45720" rtlCol="0">
-            <a:normAutofit/>
-          </a:bodyPr>
-          <a:lstStyle>
-            <a:lvl1pPr marL="228600" indent="-228600" algn="l" defTabSz="914400" rtl="0" eaLnBrk="1" latinLnBrk="0" hangingPunct="1">
-              <a:lnSpc>
-                <a:spcPct val="90000"/>
-              </a:lnSpc>
-              <a:spcBef>
-                <a:spcPts val="1000"/>
-              </a:spcBef>
-              <a:buFont typeface="Arial" panose="020B0604020202020204" pitchFamily="34" charset="0"/>
-              <a:buChar char="•"/>
-              <a:defRPr sz="2800" kern="1200">
-                <a:solidFill>
-                  <a:schemeClr val="tx1"/>
-                </a:solidFill>
-                <a:latin typeface="+mn-lt"/>
-                <a:ea typeface="+mn-ea"/>
-                <a:cs typeface="+mn-cs"/>
-              </a:defRPr>
-            </a:lvl1pPr>
-            <a:lvl2pPr marL="685800" indent="-228600" algn="l" defTabSz="914400" rtl="0" eaLnBrk="1" latinLnBrk="0" hangingPunct="1">
-              <a:lnSpc>
-                <a:spcPct val="90000"/>
-              </a:lnSpc>
-              <a:spcBef>
-                <a:spcPts val="500"/>
-              </a:spcBef>
-              <a:buFont typeface="Arial" panose="020B0604020202020204" pitchFamily="34" charset="0"/>
-              <a:buChar char="•"/>
-              <a:defRPr sz="2400" kern="1200">
-                <a:solidFill>
-                  <a:schemeClr val="tx1"/>
-                </a:solidFill>
-                <a:latin typeface="+mn-lt"/>
-                <a:ea typeface="+mn-ea"/>
-                <a:cs typeface="+mn-cs"/>
-              </a:defRPr>
-            </a:lvl2pPr>
-            <a:lvl3pPr marL="1143000" indent="-228600" algn="l" defTabSz="914400" rtl="0" eaLnBrk="1" latinLnBrk="0" hangingPunct="1">
-              <a:lnSpc>
-                <a:spcPct val="90000"/>
-              </a:lnSpc>
-              <a:spcBef>
-                <a:spcPts val="500"/>
-              </a:spcBef>
-              <a:buFont typeface="Arial" panose="020B0604020202020204" pitchFamily="34" charset="0"/>
-              <a:buChar char="•"/>
-              <a:defRPr sz="2000" kern="1200">
-                <a:solidFill>
-                  <a:schemeClr val="tx1"/>
-                </a:solidFill>
-                <a:latin typeface="+mn-lt"/>
-                <a:ea typeface="+mn-ea"/>
-                <a:cs typeface="+mn-cs"/>
-              </a:defRPr>
-            </a:lvl3pPr>
-            <a:lvl4pPr marL="1600200" indent="-228600" algn="l" defTabSz="914400" rtl="0" eaLnBrk="1" latinLnBrk="0" hangingPunct="1">
-              <a:lnSpc>
-                <a:spcPct val="90000"/>
-              </a:lnSpc>
-              <a:spcBef>
-                <a:spcPts val="500"/>
-              </a:spcBef>
-              <a:buFont typeface="Arial" panose="020B0604020202020204" pitchFamily="34" charset="0"/>
-              <a:buChar char="•"/>
-              <a:defRPr sz="1800" kern="1200">
-                <a:solidFill>
-                  <a:schemeClr val="tx1"/>
-                </a:solidFill>
-                <a:latin typeface="+mn-lt"/>
-                <a:ea typeface="+mn-ea"/>
-                <a:cs typeface="+mn-cs"/>
-              </a:defRPr>
-            </a:lvl4pPr>
-            <a:lvl5pPr marL="2057400" indent="-228600" algn="l" defTabSz="914400" rtl="0" eaLnBrk="1" latinLnBrk="0" hangingPunct="1">
-              <a:lnSpc>
-                <a:spcPct val="90000"/>
-              </a:lnSpc>
-              <a:spcBef>
-                <a:spcPts val="500"/>
-              </a:spcBef>
-              <a:buFont typeface="Arial" panose="020B0604020202020204" pitchFamily="34" charset="0"/>
-              <a:buChar char="•"/>
-              <a:defRPr sz="1800" kern="1200">
-                <a:solidFill>
-                  <a:schemeClr val="tx1"/>
-                </a:solidFill>
-                <a:latin typeface="+mn-lt"/>
-                <a:ea typeface="+mn-ea"/>
-                <a:cs typeface="+mn-cs"/>
-              </a:defRPr>
-            </a:lvl5pPr>
-            <a:lvl6pPr marL="2514600" indent="-228600" algn="l" defTabSz="914400" rtl="0" eaLnBrk="1" latinLnBrk="0" hangingPunct="1">
-              <a:lnSpc>
-                <a:spcPct val="90000"/>
-              </a:lnSpc>
-              <a:spcBef>
-                <a:spcPts val="500"/>
-              </a:spcBef>
-              <a:buFont typeface="Arial" panose="020B0604020202020204" pitchFamily="34" charset="0"/>
-              <a:buChar char="•"/>
-              <a:defRPr sz="1800" kern="1200">
-                <a:solidFill>
-                  <a:schemeClr val="tx1"/>
-                </a:solidFill>
-                <a:latin typeface="+mn-lt"/>
-                <a:ea typeface="+mn-ea"/>
-                <a:cs typeface="+mn-cs"/>
-              </a:defRPr>
-            </a:lvl6pPr>
-            <a:lvl7pPr marL="2971800" indent="-228600" algn="l" defTabSz="914400" rtl="0" eaLnBrk="1" latinLnBrk="0" hangingPunct="1">
-              <a:lnSpc>
-                <a:spcPct val="90000"/>
-              </a:lnSpc>
-              <a:spcBef>
-                <a:spcPts val="500"/>
-              </a:spcBef>
-              <a:buFont typeface="Arial" panose="020B0604020202020204" pitchFamily="34" charset="0"/>
-              <a:buChar char="•"/>
-              <a:defRPr sz="1800" kern="1200">
-                <a:solidFill>
-                  <a:schemeClr val="tx1"/>
-                </a:solidFill>
-                <a:latin typeface="+mn-lt"/>
-                <a:ea typeface="+mn-ea"/>
-                <a:cs typeface="+mn-cs"/>
-              </a:defRPr>
-            </a:lvl7pPr>
-            <a:lvl8pPr marL="3429000" indent="-228600" algn="l" defTabSz="914400" rtl="0" eaLnBrk="1" latinLnBrk="0" hangingPunct="1">
-              <a:lnSpc>
-                <a:spcPct val="90000"/>
-              </a:lnSpc>
-              <a:spcBef>
-                <a:spcPts val="500"/>
-              </a:spcBef>
-              <a:buFont typeface="Arial" panose="020B0604020202020204" pitchFamily="34" charset="0"/>
-              <a:buChar char="•"/>
-              <a:defRPr sz="1800" kern="1200">
-                <a:solidFill>
-                  <a:schemeClr val="tx1"/>
-                </a:solidFill>
-                <a:latin typeface="+mn-lt"/>
-                <a:ea typeface="+mn-ea"/>
-                <a:cs typeface="+mn-cs"/>
-              </a:defRPr>
-            </a:lvl8pPr>
-            <a:lvl9pPr marL="3886200" indent="-228600" algn="l" defTabSz="914400" rtl="0" eaLnBrk="1" latinLnBrk="0" hangingPunct="1">
-              <a:lnSpc>
-                <a:spcPct val="90000"/>
-              </a:lnSpc>
-              <a:spcBef>
-                <a:spcPts val="500"/>
-              </a:spcBef>
-              <a:buFont typeface="Arial" panose="020B0604020202020204" pitchFamily="34" charset="0"/>
-              <a:buChar char="•"/>
-              <a:defRPr sz="1800" kern="1200">
-                <a:solidFill>
-                  <a:schemeClr val="tx1"/>
-                </a:solidFill>
-                <a:latin typeface="+mn-lt"/>
-                <a:ea typeface="+mn-ea"/>
-                <a:cs typeface="+mn-cs"/>
-              </a:defRPr>
-            </a:lvl9pPr>
-          </a:lstStyle>
-          <a:p>
-            <a:pPr marL="0" indent="0">
-              <a:buFont typeface="Arial" panose="020B0604020202020204" pitchFamily="34" charset="0"/>
-              <a:buNone/>
-            </a:pPr>
-            <a:r>
-              <a:rPr lang="en-CA" sz="1800">
-                <a:solidFill>
-                  <a:srgbClr val="000000"/>
-                </a:solidFill>
-              </a:rPr>
-              <a:t>The MUT .eco file shows the property values that have been assigned</a:t>
-            </a:r>
-            <a:endParaRPr lang="en-CA"/>
-          </a:p>
-        </p:txBody>
-      </p:sp>
     </p:spTree>
     <p:extLst>
       <p:ext uri="{BB962C8B-B14F-4D97-AF65-F5344CB8AC3E}">
-        <p14:creationId xmlns:p14="http://schemas.microsoft.com/office/powerpoint/2010/main" val="2742831045"/>
-      </p:ext>
-    </p:extLst>
-  </p:cSld>
-  <p:clrMapOvr>
-    <a:masterClrMapping/>
-  </p:clrMapOvr>
-</p:sld>
-</file>
-
-<file path=ppt/slides/slide5.xml><?xml version="1.0" encoding="utf-8"?>
-<p:sld xmlns:a="http://schemas.openxmlformats.org/drawingml/2006/main" xmlns:r="http://schemas.openxmlformats.org/officeDocument/2006/relationships" xmlns:p="http://schemas.openxmlformats.org/presentationml/2006/main">
-  <p:cSld>
-    <p:spTree>
-      <p:nvGrpSpPr>
-        <p:cNvPr id="1" name=""/>
-        <p:cNvGrpSpPr/>
-        <p:nvPr/>
-      </p:nvGrpSpPr>
-      <p:grpSpPr>
-        <a:xfrm>
-          <a:off x="0" y="0"/>
-          <a:ext cx="0" cy="0"/>
-          <a:chOff x="0" y="0"/>
-          <a:chExt cx="0" cy="0"/>
-        </a:xfrm>
-      </p:grpSpPr>
-      <p:sp>
-        <p:nvSpPr>
-          <p:cNvPr id="2" name="Title 1">
-            <a:extLst>
-              <a:ext uri="{FF2B5EF4-FFF2-40B4-BE49-F238E27FC236}">
-                <a16:creationId xmlns:a16="http://schemas.microsoft.com/office/drawing/2014/main" id="{8E61C0C6-328A-9C80-C06A-4E77F1B9B202}"/>
-              </a:ext>
-            </a:extLst>
-          </p:cNvPr>
-          <p:cNvSpPr>
-            <a:spLocks noGrp="1"/>
-          </p:cNvSpPr>
-          <p:nvPr>
-            <p:ph type="title"/>
-          </p:nvPr>
-        </p:nvSpPr>
-        <p:spPr>
-          <a:xfrm>
-            <a:off x="771525" y="174626"/>
-            <a:ext cx="11068050" cy="692150"/>
-          </a:xfrm>
-        </p:spPr>
-        <p:txBody>
-          <a:bodyPr>
-            <a:normAutofit fontScale="90000"/>
-          </a:bodyPr>
-          <a:lstStyle/>
-          <a:p>
-            <a:r>
-              <a:rPr lang="en-CA"/>
-              <a:t>Materials database values for CLN and SWF domains</a:t>
-            </a:r>
-          </a:p>
-        </p:txBody>
-      </p:sp>
-      <p:sp>
-        <p:nvSpPr>
-          <p:cNvPr id="9" name="Content Placeholder 2">
-            <a:extLst>
-              <a:ext uri="{FF2B5EF4-FFF2-40B4-BE49-F238E27FC236}">
-                <a16:creationId xmlns:a16="http://schemas.microsoft.com/office/drawing/2014/main" id="{A9010BEC-514C-DB5C-8FB4-E255ACD765F4}"/>
-              </a:ext>
-            </a:extLst>
-          </p:cNvPr>
-          <p:cNvSpPr txBox="1">
-            <a:spLocks/>
-          </p:cNvSpPr>
-          <p:nvPr/>
-        </p:nvSpPr>
-        <p:spPr>
-          <a:xfrm>
-            <a:off x="771525" y="5662725"/>
-            <a:ext cx="7772922" cy="671195"/>
-          </a:xfrm>
-          <a:prstGeom prst="rect">
-            <a:avLst/>
-          </a:prstGeom>
-        </p:spPr>
-        <p:txBody>
-          <a:bodyPr vert="horz" lIns="91440" tIns="45720" rIns="91440" bIns="45720" rtlCol="0">
-            <a:normAutofit/>
-          </a:bodyPr>
-          <a:lstStyle>
-            <a:lvl1pPr marL="228600" indent="-228600" algn="l" defTabSz="914400" rtl="0" eaLnBrk="1" latinLnBrk="0" hangingPunct="1">
-              <a:lnSpc>
-                <a:spcPct val="90000"/>
-              </a:lnSpc>
-              <a:spcBef>
-                <a:spcPts val="1000"/>
-              </a:spcBef>
-              <a:buFont typeface="Arial" panose="020B0604020202020204" pitchFamily="34" charset="0"/>
-              <a:buChar char="•"/>
-              <a:defRPr sz="2800" kern="1200">
-                <a:solidFill>
-                  <a:schemeClr val="tx1"/>
-                </a:solidFill>
-                <a:latin typeface="+mn-lt"/>
-                <a:ea typeface="+mn-ea"/>
-                <a:cs typeface="+mn-cs"/>
-              </a:defRPr>
-            </a:lvl1pPr>
-            <a:lvl2pPr marL="685800" indent="-228600" algn="l" defTabSz="914400" rtl="0" eaLnBrk="1" latinLnBrk="0" hangingPunct="1">
-              <a:lnSpc>
-                <a:spcPct val="90000"/>
-              </a:lnSpc>
-              <a:spcBef>
-                <a:spcPts val="500"/>
-              </a:spcBef>
-              <a:buFont typeface="Arial" panose="020B0604020202020204" pitchFamily="34" charset="0"/>
-              <a:buChar char="•"/>
-              <a:defRPr sz="2400" kern="1200">
-                <a:solidFill>
-                  <a:schemeClr val="tx1"/>
-                </a:solidFill>
-                <a:latin typeface="+mn-lt"/>
-                <a:ea typeface="+mn-ea"/>
-                <a:cs typeface="+mn-cs"/>
-              </a:defRPr>
-            </a:lvl2pPr>
-            <a:lvl3pPr marL="1143000" indent="-228600" algn="l" defTabSz="914400" rtl="0" eaLnBrk="1" latinLnBrk="0" hangingPunct="1">
-              <a:lnSpc>
-                <a:spcPct val="90000"/>
-              </a:lnSpc>
-              <a:spcBef>
-                <a:spcPts val="500"/>
-              </a:spcBef>
-              <a:buFont typeface="Arial" panose="020B0604020202020204" pitchFamily="34" charset="0"/>
-              <a:buChar char="•"/>
-              <a:defRPr sz="2000" kern="1200">
-                <a:solidFill>
-                  <a:schemeClr val="tx1"/>
-                </a:solidFill>
-                <a:latin typeface="+mn-lt"/>
-                <a:ea typeface="+mn-ea"/>
-                <a:cs typeface="+mn-cs"/>
-              </a:defRPr>
-            </a:lvl3pPr>
-            <a:lvl4pPr marL="1600200" indent="-228600" algn="l" defTabSz="914400" rtl="0" eaLnBrk="1" latinLnBrk="0" hangingPunct="1">
-              <a:lnSpc>
-                <a:spcPct val="90000"/>
-              </a:lnSpc>
-              <a:spcBef>
-                <a:spcPts val="500"/>
-              </a:spcBef>
-              <a:buFont typeface="Arial" panose="020B0604020202020204" pitchFamily="34" charset="0"/>
-              <a:buChar char="•"/>
-              <a:defRPr sz="1800" kern="1200">
-                <a:solidFill>
-                  <a:schemeClr val="tx1"/>
-                </a:solidFill>
-                <a:latin typeface="+mn-lt"/>
-                <a:ea typeface="+mn-ea"/>
-                <a:cs typeface="+mn-cs"/>
-              </a:defRPr>
-            </a:lvl4pPr>
-            <a:lvl5pPr marL="2057400" indent="-228600" algn="l" defTabSz="914400" rtl="0" eaLnBrk="1" latinLnBrk="0" hangingPunct="1">
-              <a:lnSpc>
-                <a:spcPct val="90000"/>
-              </a:lnSpc>
-              <a:spcBef>
-                <a:spcPts val="500"/>
-              </a:spcBef>
-              <a:buFont typeface="Arial" panose="020B0604020202020204" pitchFamily="34" charset="0"/>
-              <a:buChar char="•"/>
-              <a:defRPr sz="1800" kern="1200">
-                <a:solidFill>
-                  <a:schemeClr val="tx1"/>
-                </a:solidFill>
-                <a:latin typeface="+mn-lt"/>
-                <a:ea typeface="+mn-ea"/>
-                <a:cs typeface="+mn-cs"/>
-              </a:defRPr>
-            </a:lvl5pPr>
-            <a:lvl6pPr marL="2514600" indent="-228600" algn="l" defTabSz="914400" rtl="0" eaLnBrk="1" latinLnBrk="0" hangingPunct="1">
-              <a:lnSpc>
-                <a:spcPct val="90000"/>
-              </a:lnSpc>
-              <a:spcBef>
-                <a:spcPts val="500"/>
-              </a:spcBef>
-              <a:buFont typeface="Arial" panose="020B0604020202020204" pitchFamily="34" charset="0"/>
-              <a:buChar char="•"/>
-              <a:defRPr sz="1800" kern="1200">
-                <a:solidFill>
-                  <a:schemeClr val="tx1"/>
-                </a:solidFill>
-                <a:latin typeface="+mn-lt"/>
-                <a:ea typeface="+mn-ea"/>
-                <a:cs typeface="+mn-cs"/>
-              </a:defRPr>
-            </a:lvl6pPr>
-            <a:lvl7pPr marL="2971800" indent="-228600" algn="l" defTabSz="914400" rtl="0" eaLnBrk="1" latinLnBrk="0" hangingPunct="1">
-              <a:lnSpc>
-                <a:spcPct val="90000"/>
-              </a:lnSpc>
-              <a:spcBef>
-                <a:spcPts val="500"/>
-              </a:spcBef>
-              <a:buFont typeface="Arial" panose="020B0604020202020204" pitchFamily="34" charset="0"/>
-              <a:buChar char="•"/>
-              <a:defRPr sz="1800" kern="1200">
-                <a:solidFill>
-                  <a:schemeClr val="tx1"/>
-                </a:solidFill>
-                <a:latin typeface="+mn-lt"/>
-                <a:ea typeface="+mn-ea"/>
-                <a:cs typeface="+mn-cs"/>
-              </a:defRPr>
-            </a:lvl7pPr>
-            <a:lvl8pPr marL="3429000" indent="-228600" algn="l" defTabSz="914400" rtl="0" eaLnBrk="1" latinLnBrk="0" hangingPunct="1">
-              <a:lnSpc>
-                <a:spcPct val="90000"/>
-              </a:lnSpc>
-              <a:spcBef>
-                <a:spcPts val="500"/>
-              </a:spcBef>
-              <a:buFont typeface="Arial" panose="020B0604020202020204" pitchFamily="34" charset="0"/>
-              <a:buChar char="•"/>
-              <a:defRPr sz="1800" kern="1200">
-                <a:solidFill>
-                  <a:schemeClr val="tx1"/>
-                </a:solidFill>
-                <a:latin typeface="+mn-lt"/>
-                <a:ea typeface="+mn-ea"/>
-                <a:cs typeface="+mn-cs"/>
-              </a:defRPr>
-            </a:lvl8pPr>
-            <a:lvl9pPr marL="3886200" indent="-228600" algn="l" defTabSz="914400" rtl="0" eaLnBrk="1" latinLnBrk="0" hangingPunct="1">
-              <a:lnSpc>
-                <a:spcPct val="90000"/>
-              </a:lnSpc>
-              <a:spcBef>
-                <a:spcPts val="500"/>
-              </a:spcBef>
-              <a:buFont typeface="Arial" panose="020B0604020202020204" pitchFamily="34" charset="0"/>
-              <a:buChar char="•"/>
-              <a:defRPr sz="1800" kern="1200">
-                <a:solidFill>
-                  <a:schemeClr val="tx1"/>
-                </a:solidFill>
-                <a:latin typeface="+mn-lt"/>
-                <a:ea typeface="+mn-ea"/>
-                <a:cs typeface="+mn-cs"/>
-              </a:defRPr>
-            </a:lvl9pPr>
-          </a:lstStyle>
-          <a:p>
-            <a:pPr marL="0" marR="0" lvl="0" indent="0" algn="l" defTabSz="914400" rtl="0" eaLnBrk="1" fontAlgn="auto" latinLnBrk="0" hangingPunct="1">
-              <a:lnSpc>
-                <a:spcPct val="90000"/>
-              </a:lnSpc>
-              <a:spcBef>
-                <a:spcPts val="1000"/>
-              </a:spcBef>
-              <a:spcAft>
-                <a:spcPts val="0"/>
-              </a:spcAft>
-              <a:buClrTx/>
-              <a:buSzTx/>
-              <a:buFont typeface="Arial" panose="020B0604020202020204" pitchFamily="34" charset="0"/>
-              <a:buNone/>
-              <a:tabLst/>
-              <a:defRPr/>
-            </a:pPr>
-            <a:r>
-              <a:rPr kumimoji="0" lang="en-CA" sz="1800" b="0" i="0" u="none" strike="noStrike" kern="1200" cap="none" spc="0" normalizeH="0" baseline="0" noProof="0">
-                <a:ln>
-                  <a:noFill/>
-                </a:ln>
-                <a:solidFill>
-                  <a:srgbClr val="000000"/>
-                </a:solidFill>
-                <a:effectLst/>
-                <a:uLnTx/>
-                <a:uFillTx/>
-                <a:latin typeface="Calibri" panose="020F0502020204030204"/>
-                <a:ea typeface="+mn-ea"/>
-                <a:cs typeface="+mn-cs"/>
-              </a:rPr>
-              <a:t>SWF domain properties assigned are written to the MUT .eco file</a:t>
-            </a:r>
-            <a:endParaRPr kumimoji="0" lang="en-CA" sz="2800" b="0" i="0" u="none" strike="noStrike" kern="1200" cap="none" spc="0" normalizeH="0" baseline="0" noProof="0">
-              <a:ln>
-                <a:noFill/>
-              </a:ln>
-              <a:solidFill>
-                <a:prstClr val="black"/>
-              </a:solidFill>
-              <a:effectLst/>
-              <a:uLnTx/>
-              <a:uFillTx/>
-              <a:latin typeface="Calibri" panose="020F0502020204030204"/>
-              <a:ea typeface="+mn-ea"/>
-              <a:cs typeface="+mn-cs"/>
-            </a:endParaRPr>
-          </a:p>
-        </p:txBody>
-      </p:sp>
-      <p:pic>
-        <p:nvPicPr>
-          <p:cNvPr id="7" name="Picture 6">
-            <a:extLst>
-              <a:ext uri="{FF2B5EF4-FFF2-40B4-BE49-F238E27FC236}">
-                <a16:creationId xmlns:a16="http://schemas.microsoft.com/office/drawing/2014/main" id="{8A805960-E545-2A85-DAF1-2FC799685CB4}"/>
-              </a:ext>
-            </a:extLst>
-          </p:cNvPr>
-          <p:cNvPicPr>
-            <a:picLocks noChangeAspect="1"/>
-          </p:cNvPicPr>
-          <p:nvPr/>
-        </p:nvPicPr>
-        <p:blipFill>
-          <a:blip r:embed="rId2"/>
-          <a:stretch>
-            <a:fillRect/>
-          </a:stretch>
-        </p:blipFill>
-        <p:spPr>
-          <a:xfrm>
-            <a:off x="771525" y="4145251"/>
-            <a:ext cx="8049748" cy="1428949"/>
-          </a:xfrm>
-          <a:prstGeom prst="rect">
-            <a:avLst/>
-          </a:prstGeom>
-          <a:ln>
-            <a:solidFill>
-              <a:schemeClr val="accent1"/>
-            </a:solidFill>
-          </a:ln>
-        </p:spPr>
-      </p:pic>
-      <p:pic>
-        <p:nvPicPr>
-          <p:cNvPr id="12" name="Picture 11">
-            <a:extLst>
-              <a:ext uri="{FF2B5EF4-FFF2-40B4-BE49-F238E27FC236}">
-                <a16:creationId xmlns:a16="http://schemas.microsoft.com/office/drawing/2014/main" id="{63A2DE11-CC61-16E4-D0D9-C2CEB57FA91A}"/>
-              </a:ext>
-            </a:extLst>
-          </p:cNvPr>
-          <p:cNvPicPr>
-            <a:picLocks noChangeAspect="1"/>
-          </p:cNvPicPr>
-          <p:nvPr/>
-        </p:nvPicPr>
-        <p:blipFill>
-          <a:blip r:embed="rId3"/>
-          <a:stretch>
-            <a:fillRect/>
-          </a:stretch>
-        </p:blipFill>
-        <p:spPr>
-          <a:xfrm>
-            <a:off x="771525" y="1195275"/>
-            <a:ext cx="8497486" cy="1609950"/>
-          </a:xfrm>
-          <a:prstGeom prst="rect">
-            <a:avLst/>
-          </a:prstGeom>
-          <a:ln>
-            <a:solidFill>
-              <a:schemeClr val="accent1"/>
-            </a:solidFill>
-          </a:ln>
-        </p:spPr>
-      </p:pic>
-      <p:sp>
-        <p:nvSpPr>
-          <p:cNvPr id="13" name="Content Placeholder 2">
-            <a:extLst>
-              <a:ext uri="{FF2B5EF4-FFF2-40B4-BE49-F238E27FC236}">
-                <a16:creationId xmlns:a16="http://schemas.microsoft.com/office/drawing/2014/main" id="{BE7503AD-62F6-77D8-6588-2444FD5D5DD5}"/>
-              </a:ext>
-            </a:extLst>
-          </p:cNvPr>
-          <p:cNvSpPr txBox="1">
-            <a:spLocks/>
-          </p:cNvSpPr>
-          <p:nvPr/>
-        </p:nvSpPr>
-        <p:spPr>
-          <a:xfrm>
-            <a:off x="771525" y="3005026"/>
-            <a:ext cx="7772922" cy="671195"/>
-          </a:xfrm>
-          <a:prstGeom prst="rect">
-            <a:avLst/>
-          </a:prstGeom>
-        </p:spPr>
-        <p:txBody>
-          <a:bodyPr vert="horz" lIns="91440" tIns="45720" rIns="91440" bIns="45720" rtlCol="0">
-            <a:normAutofit/>
-          </a:bodyPr>
-          <a:lstStyle>
-            <a:lvl1pPr marL="228600" indent="-228600" algn="l" defTabSz="914400" rtl="0" eaLnBrk="1" latinLnBrk="0" hangingPunct="1">
-              <a:lnSpc>
-                <a:spcPct val="90000"/>
-              </a:lnSpc>
-              <a:spcBef>
-                <a:spcPts val="1000"/>
-              </a:spcBef>
-              <a:buFont typeface="Arial" panose="020B0604020202020204" pitchFamily="34" charset="0"/>
-              <a:buChar char="•"/>
-              <a:defRPr sz="2800" kern="1200">
-                <a:solidFill>
-                  <a:schemeClr val="tx1"/>
-                </a:solidFill>
-                <a:latin typeface="+mn-lt"/>
-                <a:ea typeface="+mn-ea"/>
-                <a:cs typeface="+mn-cs"/>
-              </a:defRPr>
-            </a:lvl1pPr>
-            <a:lvl2pPr marL="685800" indent="-228600" algn="l" defTabSz="914400" rtl="0" eaLnBrk="1" latinLnBrk="0" hangingPunct="1">
-              <a:lnSpc>
-                <a:spcPct val="90000"/>
-              </a:lnSpc>
-              <a:spcBef>
-                <a:spcPts val="500"/>
-              </a:spcBef>
-              <a:buFont typeface="Arial" panose="020B0604020202020204" pitchFamily="34" charset="0"/>
-              <a:buChar char="•"/>
-              <a:defRPr sz="2400" kern="1200">
-                <a:solidFill>
-                  <a:schemeClr val="tx1"/>
-                </a:solidFill>
-                <a:latin typeface="+mn-lt"/>
-                <a:ea typeface="+mn-ea"/>
-                <a:cs typeface="+mn-cs"/>
-              </a:defRPr>
-            </a:lvl2pPr>
-            <a:lvl3pPr marL="1143000" indent="-228600" algn="l" defTabSz="914400" rtl="0" eaLnBrk="1" latinLnBrk="0" hangingPunct="1">
-              <a:lnSpc>
-                <a:spcPct val="90000"/>
-              </a:lnSpc>
-              <a:spcBef>
-                <a:spcPts val="500"/>
-              </a:spcBef>
-              <a:buFont typeface="Arial" panose="020B0604020202020204" pitchFamily="34" charset="0"/>
-              <a:buChar char="•"/>
-              <a:defRPr sz="2000" kern="1200">
-                <a:solidFill>
-                  <a:schemeClr val="tx1"/>
-                </a:solidFill>
-                <a:latin typeface="+mn-lt"/>
-                <a:ea typeface="+mn-ea"/>
-                <a:cs typeface="+mn-cs"/>
-              </a:defRPr>
-            </a:lvl3pPr>
-            <a:lvl4pPr marL="1600200" indent="-228600" algn="l" defTabSz="914400" rtl="0" eaLnBrk="1" latinLnBrk="0" hangingPunct="1">
-              <a:lnSpc>
-                <a:spcPct val="90000"/>
-              </a:lnSpc>
-              <a:spcBef>
-                <a:spcPts val="500"/>
-              </a:spcBef>
-              <a:buFont typeface="Arial" panose="020B0604020202020204" pitchFamily="34" charset="0"/>
-              <a:buChar char="•"/>
-              <a:defRPr sz="1800" kern="1200">
-                <a:solidFill>
-                  <a:schemeClr val="tx1"/>
-                </a:solidFill>
-                <a:latin typeface="+mn-lt"/>
-                <a:ea typeface="+mn-ea"/>
-                <a:cs typeface="+mn-cs"/>
-              </a:defRPr>
-            </a:lvl4pPr>
-            <a:lvl5pPr marL="2057400" indent="-228600" algn="l" defTabSz="914400" rtl="0" eaLnBrk="1" latinLnBrk="0" hangingPunct="1">
-              <a:lnSpc>
-                <a:spcPct val="90000"/>
-              </a:lnSpc>
-              <a:spcBef>
-                <a:spcPts val="500"/>
-              </a:spcBef>
-              <a:buFont typeface="Arial" panose="020B0604020202020204" pitchFamily="34" charset="0"/>
-              <a:buChar char="•"/>
-              <a:defRPr sz="1800" kern="1200">
-                <a:solidFill>
-                  <a:schemeClr val="tx1"/>
-                </a:solidFill>
-                <a:latin typeface="+mn-lt"/>
-                <a:ea typeface="+mn-ea"/>
-                <a:cs typeface="+mn-cs"/>
-              </a:defRPr>
-            </a:lvl5pPr>
-            <a:lvl6pPr marL="2514600" indent="-228600" algn="l" defTabSz="914400" rtl="0" eaLnBrk="1" latinLnBrk="0" hangingPunct="1">
-              <a:lnSpc>
-                <a:spcPct val="90000"/>
-              </a:lnSpc>
-              <a:spcBef>
-                <a:spcPts val="500"/>
-              </a:spcBef>
-              <a:buFont typeface="Arial" panose="020B0604020202020204" pitchFamily="34" charset="0"/>
-              <a:buChar char="•"/>
-              <a:defRPr sz="1800" kern="1200">
-                <a:solidFill>
-                  <a:schemeClr val="tx1"/>
-                </a:solidFill>
-                <a:latin typeface="+mn-lt"/>
-                <a:ea typeface="+mn-ea"/>
-                <a:cs typeface="+mn-cs"/>
-              </a:defRPr>
-            </a:lvl6pPr>
-            <a:lvl7pPr marL="2971800" indent="-228600" algn="l" defTabSz="914400" rtl="0" eaLnBrk="1" latinLnBrk="0" hangingPunct="1">
-              <a:lnSpc>
-                <a:spcPct val="90000"/>
-              </a:lnSpc>
-              <a:spcBef>
-                <a:spcPts val="500"/>
-              </a:spcBef>
-              <a:buFont typeface="Arial" panose="020B0604020202020204" pitchFamily="34" charset="0"/>
-              <a:buChar char="•"/>
-              <a:defRPr sz="1800" kern="1200">
-                <a:solidFill>
-                  <a:schemeClr val="tx1"/>
-                </a:solidFill>
-                <a:latin typeface="+mn-lt"/>
-                <a:ea typeface="+mn-ea"/>
-                <a:cs typeface="+mn-cs"/>
-              </a:defRPr>
-            </a:lvl7pPr>
-            <a:lvl8pPr marL="3429000" indent="-228600" algn="l" defTabSz="914400" rtl="0" eaLnBrk="1" latinLnBrk="0" hangingPunct="1">
-              <a:lnSpc>
-                <a:spcPct val="90000"/>
-              </a:lnSpc>
-              <a:spcBef>
-                <a:spcPts val="500"/>
-              </a:spcBef>
-              <a:buFont typeface="Arial" panose="020B0604020202020204" pitchFamily="34" charset="0"/>
-              <a:buChar char="•"/>
-              <a:defRPr sz="1800" kern="1200">
-                <a:solidFill>
-                  <a:schemeClr val="tx1"/>
-                </a:solidFill>
-                <a:latin typeface="+mn-lt"/>
-                <a:ea typeface="+mn-ea"/>
-                <a:cs typeface="+mn-cs"/>
-              </a:defRPr>
-            </a:lvl8pPr>
-            <a:lvl9pPr marL="3886200" indent="-228600" algn="l" defTabSz="914400" rtl="0" eaLnBrk="1" latinLnBrk="0" hangingPunct="1">
-              <a:lnSpc>
-                <a:spcPct val="90000"/>
-              </a:lnSpc>
-              <a:spcBef>
-                <a:spcPts val="500"/>
-              </a:spcBef>
-              <a:buFont typeface="Arial" panose="020B0604020202020204" pitchFamily="34" charset="0"/>
-              <a:buChar char="•"/>
-              <a:defRPr sz="1800" kern="1200">
-                <a:solidFill>
-                  <a:schemeClr val="tx1"/>
-                </a:solidFill>
-                <a:latin typeface="+mn-lt"/>
-                <a:ea typeface="+mn-ea"/>
-                <a:cs typeface="+mn-cs"/>
-              </a:defRPr>
-            </a:lvl9pPr>
-          </a:lstStyle>
-          <a:p>
-            <a:pPr marL="0" marR="0" lvl="0" indent="0" algn="l" defTabSz="914400" rtl="0" eaLnBrk="1" fontAlgn="auto" latinLnBrk="0" hangingPunct="1">
-              <a:lnSpc>
-                <a:spcPct val="90000"/>
-              </a:lnSpc>
-              <a:spcBef>
-                <a:spcPts val="1000"/>
-              </a:spcBef>
-              <a:spcAft>
-                <a:spcPts val="0"/>
-              </a:spcAft>
-              <a:buClrTx/>
-              <a:buSzTx/>
-              <a:buFont typeface="Arial" panose="020B0604020202020204" pitchFamily="34" charset="0"/>
-              <a:buNone/>
-              <a:tabLst/>
-              <a:defRPr/>
-            </a:pPr>
-            <a:r>
-              <a:rPr kumimoji="0" lang="en-CA" sz="1800" b="0" i="0" u="none" strike="noStrike" kern="1200" cap="none" spc="0" normalizeH="0" baseline="0" noProof="0">
-                <a:ln>
-                  <a:noFill/>
-                </a:ln>
-                <a:solidFill>
-                  <a:srgbClr val="000000"/>
-                </a:solidFill>
-                <a:effectLst/>
-                <a:uLnTx/>
-                <a:uFillTx/>
-                <a:latin typeface="Calibri" panose="020F0502020204030204"/>
-                <a:ea typeface="+mn-ea"/>
-                <a:cs typeface="+mn-cs"/>
-              </a:rPr>
-              <a:t>CLN domain properties assigned are written to the MUT .eco file</a:t>
-            </a:r>
-            <a:endParaRPr kumimoji="0" lang="en-CA" sz="2800" b="0" i="0" u="none" strike="noStrike" kern="1200" cap="none" spc="0" normalizeH="0" baseline="0" noProof="0">
-              <a:ln>
-                <a:noFill/>
-              </a:ln>
-              <a:solidFill>
-                <a:prstClr val="black"/>
-              </a:solidFill>
-              <a:effectLst/>
-              <a:uLnTx/>
-              <a:uFillTx/>
-              <a:latin typeface="Calibri" panose="020F0502020204030204"/>
-              <a:ea typeface="+mn-ea"/>
-              <a:cs typeface="+mn-cs"/>
-            </a:endParaRPr>
-          </a:p>
-        </p:txBody>
-      </p:sp>
-    </p:spTree>
-    <p:extLst>
-      <p:ext uri="{BB962C8B-B14F-4D97-AF65-F5344CB8AC3E}">
-        <p14:creationId xmlns:p14="http://schemas.microsoft.com/office/powerpoint/2010/main" val="546387338"/>
-      </p:ext>
-    </p:extLst>
-  </p:cSld>
-  <p:clrMapOvr>
-    <a:masterClrMapping/>
-  </p:clrMapOvr>
-</p:sld>
-</file>
-
-<file path=ppt/slides/slide6.xml><?xml version="1.0" encoding="utf-8"?>
-<p:sld xmlns:a="http://schemas.openxmlformats.org/drawingml/2006/main" xmlns:r="http://schemas.openxmlformats.org/officeDocument/2006/relationships" xmlns:p="http://schemas.openxmlformats.org/presentationml/2006/main">
-  <p:cSld>
-    <p:spTree>
-      <p:nvGrpSpPr>
-        <p:cNvPr id="1" name=""/>
-        <p:cNvGrpSpPr/>
-        <p:nvPr/>
-      </p:nvGrpSpPr>
-      <p:grpSpPr>
-        <a:xfrm>
-          <a:off x="0" y="0"/>
-          <a:ext cx="0" cy="0"/>
-          <a:chOff x="0" y="0"/>
-          <a:chExt cx="0" cy="0"/>
-        </a:xfrm>
-      </p:grpSpPr>
-      <p:sp>
-        <p:nvSpPr>
-          <p:cNvPr id="2" name="Title 1">
-            <a:extLst>
-              <a:ext uri="{FF2B5EF4-FFF2-40B4-BE49-F238E27FC236}">
-                <a16:creationId xmlns:a16="http://schemas.microsoft.com/office/drawing/2014/main" id="{4A10BB69-1CBC-45A3-F671-79766425E915}"/>
-              </a:ext>
-            </a:extLst>
-          </p:cNvPr>
-          <p:cNvSpPr>
-            <a:spLocks noGrp="1"/>
-          </p:cNvSpPr>
-          <p:nvPr>
-            <p:ph type="title"/>
-          </p:nvPr>
-        </p:nvSpPr>
-        <p:spPr>
-          <a:xfrm>
-            <a:off x="838200" y="365126"/>
-            <a:ext cx="10515600" cy="711200"/>
-          </a:xfrm>
-        </p:spPr>
-        <p:txBody>
-          <a:bodyPr/>
-          <a:lstStyle/>
-          <a:p>
-            <a:r>
-              <a:rPr lang="en-CA"/>
-              <a:t>Time and Length Units in MUT</a:t>
-            </a:r>
-          </a:p>
-        </p:txBody>
-      </p:sp>
-      <p:sp>
-        <p:nvSpPr>
-          <p:cNvPr id="3" name="Content Placeholder 2">
-            <a:extLst>
-              <a:ext uri="{FF2B5EF4-FFF2-40B4-BE49-F238E27FC236}">
-                <a16:creationId xmlns:a16="http://schemas.microsoft.com/office/drawing/2014/main" id="{0DFA125B-1949-C3FA-5732-54F6F0DEBE23}"/>
-              </a:ext>
-            </a:extLst>
-          </p:cNvPr>
-          <p:cNvSpPr>
-            <a:spLocks noGrp="1"/>
-          </p:cNvSpPr>
-          <p:nvPr>
-            <p:ph idx="1"/>
-          </p:nvPr>
-        </p:nvSpPr>
-        <p:spPr>
-          <a:xfrm>
-            <a:off x="838200" y="1368425"/>
-            <a:ext cx="10515600" cy="4351338"/>
-          </a:xfrm>
-        </p:spPr>
-        <p:txBody>
-          <a:bodyPr>
-            <a:normAutofit fontScale="92500" lnSpcReduction="20000"/>
-          </a:bodyPr>
-          <a:lstStyle/>
-          <a:p>
-            <a:pPr marL="0" indent="0">
-              <a:buNone/>
-            </a:pPr>
-            <a:r>
-              <a:rPr lang="en-CA"/>
-              <a:t>Currently, the MUT build assumes time units of seconds and length units of metres for all inputs. </a:t>
-            </a:r>
-          </a:p>
-          <a:p>
-            <a:r>
-              <a:rPr lang="en-CA"/>
-              <a:t>The 2_VSF_Hillslope and  4_SWF_RCH_CRD examples have been converted to time units of seconds. This fixed the problem we had previously with different results for the two examples. </a:t>
-            </a:r>
-          </a:p>
-          <a:p>
-            <a:r>
-              <a:rPr lang="en-CA"/>
-              <a:t>Although the results match HGS, the 1_VSF_Column example should be checked</a:t>
-            </a:r>
-          </a:p>
-          <a:p>
-            <a:pPr marL="0" indent="0">
-              <a:buNone/>
-            </a:pPr>
-            <a:r>
-              <a:rPr lang="en-CA"/>
-              <a:t>The MUT  instruction </a:t>
-            </a:r>
-            <a:r>
-              <a:rPr lang="en-CA" sz="1800">
-                <a:latin typeface="Consolas" panose="020B0609020204030204" pitchFamily="49" charset="0"/>
-              </a:rPr>
-              <a:t>'modflow output to modflow structure’</a:t>
-            </a:r>
-            <a:r>
-              <a:rPr lang="en-CA"/>
-              <a:t> does read the time and length unit names (e.g. </a:t>
-            </a:r>
-            <a:r>
-              <a:rPr lang="en-CA" cap="all"/>
-              <a:t>Seconds, metres</a:t>
-            </a:r>
-            <a:r>
-              <a:rPr lang="en-CA"/>
-              <a:t>) from the listing file but only uses them to to display in Tecplot.</a:t>
-            </a:r>
-          </a:p>
-          <a:p>
-            <a:pPr marL="0" indent="0">
-              <a:buNone/>
-            </a:pPr>
-            <a:r>
-              <a:rPr lang="en-CA" b="1"/>
-              <a:t>At some point, we will need to  implement options for these inputs for the build step. </a:t>
-            </a:r>
-          </a:p>
-          <a:p>
-            <a:endParaRPr lang="en-CA"/>
-          </a:p>
-        </p:txBody>
-      </p:sp>
-    </p:spTree>
-    <p:extLst>
-      <p:ext uri="{BB962C8B-B14F-4D97-AF65-F5344CB8AC3E}">
-        <p14:creationId xmlns:p14="http://schemas.microsoft.com/office/powerpoint/2010/main" val="585307212"/>
-      </p:ext>
-    </p:extLst>
-  </p:cSld>
-  <p:clrMapOvr>
-    <a:masterClrMapping/>
-  </p:clrMapOvr>
-</p:sld>
-</file>
-
-<file path=ppt/slides/slide7.xml><?xml version="1.0" encoding="utf-8"?>
-<p:sld xmlns:a="http://schemas.openxmlformats.org/drawingml/2006/main" xmlns:r="http://schemas.openxmlformats.org/officeDocument/2006/relationships" xmlns:p="http://schemas.openxmlformats.org/presentationml/2006/main">
-  <p:cSld>
-    <p:spTree>
-      <p:nvGrpSpPr>
-        <p:cNvPr id="1" name=""/>
-        <p:cNvGrpSpPr/>
-        <p:nvPr/>
-      </p:nvGrpSpPr>
-      <p:grpSpPr>
-        <a:xfrm>
-          <a:off x="0" y="0"/>
-          <a:ext cx="0" cy="0"/>
-          <a:chOff x="0" y="0"/>
-          <a:chExt cx="0" cy="0"/>
-        </a:xfrm>
-      </p:grpSpPr>
-      <p:pic>
-        <p:nvPicPr>
-          <p:cNvPr id="10" name="Picture 9">
-            <a:extLst>
-              <a:ext uri="{FF2B5EF4-FFF2-40B4-BE49-F238E27FC236}">
-                <a16:creationId xmlns:a16="http://schemas.microsoft.com/office/drawing/2014/main" id="{BCB5B4DA-FD3C-FF25-CAC9-DEA955E4521F}"/>
-              </a:ext>
-            </a:extLst>
-          </p:cNvPr>
-          <p:cNvPicPr>
-            <a:picLocks noChangeAspect="1"/>
-          </p:cNvPicPr>
-          <p:nvPr/>
-        </p:nvPicPr>
-        <p:blipFill>
-          <a:blip r:embed="rId2">
-            <a:extLst>
-              <a:ext uri="{28A0092B-C50C-407E-A947-70E740481C1C}">
-                <a14:useLocalDpi xmlns:a14="http://schemas.microsoft.com/office/drawing/2010/main" val="0"/>
-              </a:ext>
-            </a:extLst>
-          </a:blip>
-          <a:stretch>
-            <a:fillRect/>
-          </a:stretch>
-        </p:blipFill>
-        <p:spPr>
-          <a:xfrm>
-            <a:off x="256480" y="0"/>
-            <a:ext cx="11679040" cy="6858000"/>
-          </a:xfrm>
-          <a:prstGeom prst="rect">
-            <a:avLst/>
-          </a:prstGeom>
-        </p:spPr>
-      </p:pic>
-    </p:spTree>
-    <p:extLst>
-      <p:ext uri="{BB962C8B-B14F-4D97-AF65-F5344CB8AC3E}">
-        <p14:creationId xmlns:p14="http://schemas.microsoft.com/office/powerpoint/2010/main" val="857062011"/>
-      </p:ext>
-    </p:extLst>
-  </p:cSld>
-  <p:clrMapOvr>
-    <a:masterClrMapping/>
-  </p:clrMapOvr>
-</p:sld>
-</file>
-
-<file path=ppt/slides/slide8.xml><?xml version="1.0" encoding="utf-8"?>
-<p:sld xmlns:a="http://schemas.openxmlformats.org/drawingml/2006/main" xmlns:r="http://schemas.openxmlformats.org/officeDocument/2006/relationships" xmlns:p="http://schemas.openxmlformats.org/presentationml/2006/main">
-  <p:cSld>
-    <p:spTree>
-      <p:nvGrpSpPr>
-        <p:cNvPr id="1" name=""/>
-        <p:cNvGrpSpPr/>
-        <p:nvPr/>
-      </p:nvGrpSpPr>
-      <p:grpSpPr>
-        <a:xfrm>
-          <a:off x="0" y="0"/>
-          <a:ext cx="0" cy="0"/>
-          <a:chOff x="0" y="0"/>
-          <a:chExt cx="0" cy="0"/>
-        </a:xfrm>
-      </p:grpSpPr>
-      <p:pic>
-        <p:nvPicPr>
-          <p:cNvPr id="7" name="Picture 6">
-            <a:extLst>
-              <a:ext uri="{FF2B5EF4-FFF2-40B4-BE49-F238E27FC236}">
-                <a16:creationId xmlns:a16="http://schemas.microsoft.com/office/drawing/2014/main" id="{C5DD5B08-6362-FCE0-8EBC-1070F001CFBB}"/>
-              </a:ext>
-            </a:extLst>
-          </p:cNvPr>
-          <p:cNvPicPr>
-            <a:picLocks noChangeAspect="1"/>
-          </p:cNvPicPr>
-          <p:nvPr/>
-        </p:nvPicPr>
-        <p:blipFill>
-          <a:blip r:embed="rId2">
-            <a:extLst>
-              <a:ext uri="{28A0092B-C50C-407E-A947-70E740481C1C}">
-                <a14:useLocalDpi xmlns:a14="http://schemas.microsoft.com/office/drawing/2010/main" val="0"/>
-              </a:ext>
-            </a:extLst>
-          </a:blip>
-          <a:stretch>
-            <a:fillRect/>
-          </a:stretch>
-        </p:blipFill>
-        <p:spPr>
-          <a:xfrm>
-            <a:off x="256480" y="0"/>
-            <a:ext cx="11679040" cy="6858000"/>
-          </a:xfrm>
-          <a:prstGeom prst="rect">
-            <a:avLst/>
-          </a:prstGeom>
-        </p:spPr>
-      </p:pic>
-    </p:spTree>
-    <p:extLst>
-      <p:ext uri="{BB962C8B-B14F-4D97-AF65-F5344CB8AC3E}">
-        <p14:creationId xmlns:p14="http://schemas.microsoft.com/office/powerpoint/2010/main" val="4096595025"/>
-      </p:ext>
-    </p:extLst>
-  </p:cSld>
-  <p:clrMapOvr>
-    <a:masterClrMapping/>
-  </p:clrMapOvr>
-</p:sld>
-</file>
-
-<file path=ppt/slides/slide9.xml><?xml version="1.0" encoding="utf-8"?>
-<p:sld xmlns:a="http://schemas.openxmlformats.org/drawingml/2006/main" xmlns:r="http://schemas.openxmlformats.org/officeDocument/2006/relationships" xmlns:p="http://schemas.openxmlformats.org/presentationml/2006/main">
-  <p:cSld>
-    <p:spTree>
-      <p:nvGrpSpPr>
-        <p:cNvPr id="1" name=""/>
-        <p:cNvGrpSpPr/>
-        <p:nvPr/>
-      </p:nvGrpSpPr>
-      <p:grpSpPr>
-        <a:xfrm>
-          <a:off x="0" y="0"/>
-          <a:ext cx="0" cy="0"/>
-          <a:chOff x="0" y="0"/>
-          <a:chExt cx="0" cy="0"/>
-        </a:xfrm>
-      </p:grpSpPr>
-      <p:pic>
-        <p:nvPicPr>
-          <p:cNvPr id="3" name="Picture 2">
-            <a:extLst>
-              <a:ext uri="{FF2B5EF4-FFF2-40B4-BE49-F238E27FC236}">
-                <a16:creationId xmlns:a16="http://schemas.microsoft.com/office/drawing/2014/main" id="{F05F4D3D-78B9-D693-6AFE-E0873EA3F39A}"/>
-              </a:ext>
-            </a:extLst>
-          </p:cNvPr>
-          <p:cNvPicPr>
-            <a:picLocks noChangeAspect="1"/>
-          </p:cNvPicPr>
-          <p:nvPr/>
-        </p:nvPicPr>
-        <p:blipFill>
-          <a:blip r:embed="rId2">
-            <a:extLst>
-              <a:ext uri="{28A0092B-C50C-407E-A947-70E740481C1C}">
-                <a14:useLocalDpi xmlns:a14="http://schemas.microsoft.com/office/drawing/2010/main" val="0"/>
-              </a:ext>
-            </a:extLst>
-          </a:blip>
-          <a:stretch>
-            <a:fillRect/>
-          </a:stretch>
-        </p:blipFill>
-        <p:spPr>
-          <a:xfrm>
-            <a:off x="242383" y="0"/>
-            <a:ext cx="11707233" cy="6858000"/>
-          </a:xfrm>
-          <a:prstGeom prst="rect">
-            <a:avLst/>
-          </a:prstGeom>
-        </p:spPr>
-      </p:pic>
-      <p:sp>
-        <p:nvSpPr>
-          <p:cNvPr id="6" name="TextBox 5">
-            <a:extLst>
-              <a:ext uri="{FF2B5EF4-FFF2-40B4-BE49-F238E27FC236}">
-                <a16:creationId xmlns:a16="http://schemas.microsoft.com/office/drawing/2014/main" id="{070D1BD6-B837-972B-429D-ED0919244EB1}"/>
-              </a:ext>
-            </a:extLst>
-          </p:cNvPr>
-          <p:cNvSpPr txBox="1"/>
-          <p:nvPr/>
-        </p:nvSpPr>
-        <p:spPr>
-          <a:xfrm>
-            <a:off x="413656" y="674914"/>
-            <a:ext cx="9148355" cy="646331"/>
-          </a:xfrm>
-          <a:prstGeom prst="rect">
-            <a:avLst/>
-          </a:prstGeom>
-          <a:solidFill>
-            <a:srgbClr val="FFFF00"/>
-          </a:solidFill>
-        </p:spPr>
-        <p:txBody>
-          <a:bodyPr wrap="square" rtlCol="0">
-            <a:spAutoFit/>
-          </a:bodyPr>
-          <a:lstStyle/>
-          <a:p>
-            <a:r>
-              <a:rPr lang="en-CA"/>
-              <a:t>This is the case with recharge and drain boundary conditions across the entire top of the GWF domain and </a:t>
-            </a:r>
-            <a:r>
-              <a:rPr lang="en-CA" b="1"/>
-              <a:t>no SWF domain.</a:t>
-            </a:r>
-          </a:p>
-        </p:txBody>
-      </p:sp>
-    </p:spTree>
-    <p:extLst>
-      <p:ext uri="{BB962C8B-B14F-4D97-AF65-F5344CB8AC3E}">
-        <p14:creationId xmlns:p14="http://schemas.microsoft.com/office/powerpoint/2010/main" val="366391453"/>
+        <p14:creationId xmlns:p14="http://schemas.microsoft.com/office/powerpoint/2010/main" val="2264670390"/>
       </p:ext>
     </p:extLst>
   </p:cSld>

</xml_diff>